<commit_message>
BDD GONIO inversion X et Y. ConvCoord correction du FromMGRS
</commit_message>
<xml_diff>
--- a/cours/Guide - obtenir des cartes.pptx
+++ b/cours/Guide - obtenir des cartes.pptx
@@ -5,7 +5,7 @@
     <p:sldMasterId id="2147483667" r:id="rId1"/>
   </p:sldMasterIdLst>
   <p:notesMasterIdLst>
-    <p:notesMasterId r:id="rId30"/>
+    <p:notesMasterId r:id="rId31"/>
   </p:notesMasterIdLst>
   <p:sldIdLst>
     <p:sldId id="276" r:id="rId2"/>
@@ -13,29 +13,30 @@
     <p:sldId id="279" r:id="rId4"/>
     <p:sldId id="282" r:id="rId5"/>
     <p:sldId id="281" r:id="rId6"/>
-    <p:sldId id="286" r:id="rId7"/>
-    <p:sldId id="287" r:id="rId8"/>
-    <p:sldId id="291" r:id="rId9"/>
-    <p:sldId id="290" r:id="rId10"/>
-    <p:sldId id="289" r:id="rId11"/>
-    <p:sldId id="278" r:id="rId12"/>
-    <p:sldId id="280" r:id="rId13"/>
-    <p:sldId id="283" r:id="rId14"/>
-    <p:sldId id="284" r:id="rId15"/>
-    <p:sldId id="294" r:id="rId16"/>
-    <p:sldId id="257" r:id="rId17"/>
-    <p:sldId id="258" r:id="rId18"/>
-    <p:sldId id="259" r:id="rId19"/>
-    <p:sldId id="260" r:id="rId20"/>
-    <p:sldId id="261" r:id="rId21"/>
-    <p:sldId id="262" r:id="rId22"/>
-    <p:sldId id="263" r:id="rId23"/>
-    <p:sldId id="295" r:id="rId24"/>
-    <p:sldId id="265" r:id="rId25"/>
-    <p:sldId id="266" r:id="rId26"/>
-    <p:sldId id="267" r:id="rId27"/>
-    <p:sldId id="268" r:id="rId28"/>
-    <p:sldId id="292" r:id="rId29"/>
+    <p:sldId id="296" r:id="rId7"/>
+    <p:sldId id="286" r:id="rId8"/>
+    <p:sldId id="287" r:id="rId9"/>
+    <p:sldId id="291" r:id="rId10"/>
+    <p:sldId id="290" r:id="rId11"/>
+    <p:sldId id="289" r:id="rId12"/>
+    <p:sldId id="278" r:id="rId13"/>
+    <p:sldId id="280" r:id="rId14"/>
+    <p:sldId id="283" r:id="rId15"/>
+    <p:sldId id="284" r:id="rId16"/>
+    <p:sldId id="294" r:id="rId17"/>
+    <p:sldId id="257" r:id="rId18"/>
+    <p:sldId id="258" r:id="rId19"/>
+    <p:sldId id="259" r:id="rId20"/>
+    <p:sldId id="260" r:id="rId21"/>
+    <p:sldId id="261" r:id="rId22"/>
+    <p:sldId id="262" r:id="rId23"/>
+    <p:sldId id="263" r:id="rId24"/>
+    <p:sldId id="295" r:id="rId25"/>
+    <p:sldId id="265" r:id="rId26"/>
+    <p:sldId id="266" r:id="rId27"/>
+    <p:sldId id="267" r:id="rId28"/>
+    <p:sldId id="268" r:id="rId29"/>
+    <p:sldId id="292" r:id="rId30"/>
   </p:sldIdLst>
   <p:sldSz cx="9144000" cy="6858000" type="screen4x3"/>
   <p:notesSz cx="6858000" cy="9144000"/>
@@ -224,7 +225,7 @@
           <a:p>
             <a:fld id="{5C348F8D-022D-404F-B7E9-2A064090EDFB}" type="datetimeFigureOut">
               <a:rPr lang="fr-FR" smtClean="0"/>
-              <a:t>10/05/2021</a:t>
+              <a:t>29/05/2021</a:t>
             </a:fld>
             <a:endParaRPr lang="fr-FR"/>
           </a:p>
@@ -604,6 +605,261 @@
       </p:grpSpPr>
       <p:sp>
         <p:nvSpPr>
+          <p:cNvPr id="124930" name="Espace réservé de l'image des diapositives 1"/>
+          <p:cNvSpPr>
+            <a:spLocks noGrp="1" noRot="1" noChangeAspect="1"/>
+          </p:cNvSpPr>
+          <p:nvPr>
+            <p:ph type="sldImg"/>
+          </p:nvPr>
+        </p:nvSpPr>
+        <p:spPr bwMode="auto">
+          <a:xfrm>
+            <a:off x="917575" y="744538"/>
+            <a:ext cx="4962525" cy="3722687"/>
+          </a:xfrm>
+          <a:prstGeom prst="rect">
+            <a:avLst/>
+          </a:prstGeom>
+          <a:noFill/>
+          <a:ln w="12700">
+            <a:solidFill>
+              <a:srgbClr val="000000"/>
+            </a:solidFill>
+            <a:miter lim="800000"/>
+            <a:headEnd/>
+            <a:tailEnd/>
+          </a:ln>
+          <a:extLst>
+            <a:ext uri="{909E8E84-426E-40DD-AFC4-6F175D3DCCD1}">
+              <a14:hiddenFill xmlns:a14="http://schemas.microsoft.com/office/drawing/2010/main">
+                <a:solidFill>
+                  <a:srgbClr val="FFFFFF"/>
+                </a:solidFill>
+              </a14:hiddenFill>
+            </a:ext>
+          </a:extLst>
+        </p:spPr>
+      </p:sp>
+      <p:sp>
+        <p:nvSpPr>
+          <p:cNvPr id="124931" name="Espace réservé des commentaires 2"/>
+          <p:cNvSpPr>
+            <a:spLocks noGrp="1"/>
+          </p:cNvSpPr>
+          <p:nvPr>
+            <p:ph type="body" idx="1"/>
+          </p:nvPr>
+        </p:nvSpPr>
+        <p:spPr>
+          <a:noFill/>
+          <a:extLst>
+            <a:ext uri="{909E8E84-426E-40DD-AFC4-6F175D3DCCD1}">
+              <a14:hiddenFill xmlns:a14="http://schemas.microsoft.com/office/drawing/2010/main">
+                <a:solidFill>
+                  <a:srgbClr val="FFFFFF"/>
+                </a:solidFill>
+              </a14:hiddenFill>
+            </a:ext>
+            <a:ext uri="{91240B29-F687-4F45-9708-019B960494DF}">
+              <a14:hiddenLine xmlns:a14="http://schemas.microsoft.com/office/drawing/2010/main" w="9525">
+                <a:solidFill>
+                  <a:srgbClr val="000000"/>
+                </a:solidFill>
+                <a:miter lim="800000"/>
+                <a:headEnd/>
+                <a:tailEnd/>
+              </a14:hiddenLine>
+            </a:ext>
+          </a:extLst>
+        </p:spPr>
+        <p:txBody>
+          <a:bodyPr/>
+          <a:lstStyle/>
+          <a:p>
+            <a:r>
+              <a:rPr lang="fr-FR" altLang="fr-FR">
+                <a:latin typeface="Arial" panose="020B0604020202020204" pitchFamily="34" charset="0"/>
+              </a:rPr>
+              <a:t>Cartographie réalisée sur le théatre (MGCP) téléchargeable sur le site du 28GG </a:t>
+            </a:r>
+          </a:p>
+        </p:txBody>
+      </p:sp>
+      <p:sp>
+        <p:nvSpPr>
+          <p:cNvPr id="124932" name="Espace réservé du numéro de diapositive 3"/>
+          <p:cNvSpPr>
+            <a:spLocks noGrp="1"/>
+          </p:cNvSpPr>
+          <p:nvPr>
+            <p:ph type="sldNum" sz="quarter" idx="5"/>
+          </p:nvPr>
+        </p:nvSpPr>
+        <p:spPr>
+          <a:noFill/>
+          <a:extLst>
+            <a:ext uri="{909E8E84-426E-40DD-AFC4-6F175D3DCCD1}">
+              <a14:hiddenFill xmlns:a14="http://schemas.microsoft.com/office/drawing/2010/main">
+                <a:solidFill>
+                  <a:srgbClr val="FFFFFF"/>
+                </a:solidFill>
+              </a14:hiddenFill>
+            </a:ext>
+            <a:ext uri="{91240B29-F687-4F45-9708-019B960494DF}">
+              <a14:hiddenLine xmlns:a14="http://schemas.microsoft.com/office/drawing/2010/main" w="9525">
+                <a:solidFill>
+                  <a:srgbClr val="000000"/>
+                </a:solidFill>
+                <a:miter lim="800000"/>
+                <a:headEnd/>
+                <a:tailEnd/>
+              </a14:hiddenLine>
+            </a:ext>
+          </a:extLst>
+        </p:spPr>
+        <p:txBody>
+          <a:bodyPr/>
+          <a:lstStyle>
+            <a:lvl1pPr defTabSz="920750">
+              <a:defRPr>
+                <a:solidFill>
+                  <a:schemeClr val="tx1"/>
+                </a:solidFill>
+                <a:latin typeface="Arial" panose="020B0604020202020204" pitchFamily="34" charset="0"/>
+              </a:defRPr>
+            </a:lvl1pPr>
+            <a:lvl2pPr marL="742950" indent="-285750" defTabSz="920750">
+              <a:defRPr>
+                <a:solidFill>
+                  <a:schemeClr val="tx1"/>
+                </a:solidFill>
+                <a:latin typeface="Arial" panose="020B0604020202020204" pitchFamily="34" charset="0"/>
+              </a:defRPr>
+            </a:lvl2pPr>
+            <a:lvl3pPr marL="1143000" indent="-228600" defTabSz="920750">
+              <a:defRPr>
+                <a:solidFill>
+                  <a:schemeClr val="tx1"/>
+                </a:solidFill>
+                <a:latin typeface="Arial" panose="020B0604020202020204" pitchFamily="34" charset="0"/>
+              </a:defRPr>
+            </a:lvl3pPr>
+            <a:lvl4pPr marL="1600200" indent="-228600" defTabSz="920750">
+              <a:defRPr>
+                <a:solidFill>
+                  <a:schemeClr val="tx1"/>
+                </a:solidFill>
+                <a:latin typeface="Arial" panose="020B0604020202020204" pitchFamily="34" charset="0"/>
+              </a:defRPr>
+            </a:lvl4pPr>
+            <a:lvl5pPr marL="2057400" indent="-228600" defTabSz="920750">
+              <a:defRPr>
+                <a:solidFill>
+                  <a:schemeClr val="tx1"/>
+                </a:solidFill>
+                <a:latin typeface="Arial" panose="020B0604020202020204" pitchFamily="34" charset="0"/>
+              </a:defRPr>
+            </a:lvl5pPr>
+            <a:lvl6pPr marL="2514600" indent="-228600" defTabSz="920750" eaLnBrk="0" fontAlgn="base" hangingPunct="0">
+              <a:spcBef>
+                <a:spcPct val="0"/>
+              </a:spcBef>
+              <a:spcAft>
+                <a:spcPct val="0"/>
+              </a:spcAft>
+              <a:defRPr>
+                <a:solidFill>
+                  <a:schemeClr val="tx1"/>
+                </a:solidFill>
+                <a:latin typeface="Arial" panose="020B0604020202020204" pitchFamily="34" charset="0"/>
+              </a:defRPr>
+            </a:lvl6pPr>
+            <a:lvl7pPr marL="2971800" indent="-228600" defTabSz="920750" eaLnBrk="0" fontAlgn="base" hangingPunct="0">
+              <a:spcBef>
+                <a:spcPct val="0"/>
+              </a:spcBef>
+              <a:spcAft>
+                <a:spcPct val="0"/>
+              </a:spcAft>
+              <a:defRPr>
+                <a:solidFill>
+                  <a:schemeClr val="tx1"/>
+                </a:solidFill>
+                <a:latin typeface="Arial" panose="020B0604020202020204" pitchFamily="34" charset="0"/>
+              </a:defRPr>
+            </a:lvl7pPr>
+            <a:lvl8pPr marL="3429000" indent="-228600" defTabSz="920750" eaLnBrk="0" fontAlgn="base" hangingPunct="0">
+              <a:spcBef>
+                <a:spcPct val="0"/>
+              </a:spcBef>
+              <a:spcAft>
+                <a:spcPct val="0"/>
+              </a:spcAft>
+              <a:defRPr>
+                <a:solidFill>
+                  <a:schemeClr val="tx1"/>
+                </a:solidFill>
+                <a:latin typeface="Arial" panose="020B0604020202020204" pitchFamily="34" charset="0"/>
+              </a:defRPr>
+            </a:lvl8pPr>
+            <a:lvl9pPr marL="3886200" indent="-228600" defTabSz="920750" eaLnBrk="0" fontAlgn="base" hangingPunct="0">
+              <a:spcBef>
+                <a:spcPct val="0"/>
+              </a:spcBef>
+              <a:spcAft>
+                <a:spcPct val="0"/>
+              </a:spcAft>
+              <a:defRPr>
+                <a:solidFill>
+                  <a:schemeClr val="tx1"/>
+                </a:solidFill>
+                <a:latin typeface="Arial" panose="020B0604020202020204" pitchFamily="34" charset="0"/>
+              </a:defRPr>
+            </a:lvl9pPr>
+          </a:lstStyle>
+          <a:p>
+            <a:fld id="{024FE29A-0FFA-4EAC-A640-10268E671FEF}" type="slidenum">
+              <a:rPr lang="fr-FR" altLang="fr-FR"/>
+              <a:pPr/>
+              <a:t>26</a:t>
+            </a:fld>
+            <a:endParaRPr lang="fr-FR" altLang="fr-FR"/>
+          </a:p>
+        </p:txBody>
+      </p:sp>
+    </p:spTree>
+    <p:extLst>
+      <p:ext uri="{BB962C8B-B14F-4D97-AF65-F5344CB8AC3E}">
+        <p14:creationId xmlns:p14="http://schemas.microsoft.com/office/powerpoint/2010/main" val="486725490"/>
+      </p:ext>
+    </p:extLst>
+  </p:cSld>
+  <p:clrMapOvr>
+    <a:masterClrMapping/>
+  </p:clrMapOvr>
+</p:notes>
+</file>
+
+<file path=ppt/notesSlides/notesSlide11.xml><?xml version="1.0" encoding="utf-8"?>
+<p:notes xmlns:a="http://schemas.openxmlformats.org/drawingml/2006/main" xmlns:r="http://schemas.openxmlformats.org/officeDocument/2006/relationships" xmlns:p="http://schemas.openxmlformats.org/presentationml/2006/main">
+  <p:cSld>
+    <p:spTree>
+      <p:nvGrpSpPr>
+        <p:cNvPr id="1" name=""/>
+        <p:cNvGrpSpPr/>
+        <p:nvPr/>
+      </p:nvGrpSpPr>
+      <p:grpSpPr>
+        <a:xfrm>
+          <a:off x="0" y="0"/>
+          <a:ext cx="0" cy="0"/>
+          <a:chOff x="0" y="0"/>
+          <a:chExt cx="0" cy="0"/>
+        </a:xfrm>
+      </p:grpSpPr>
+      <p:sp>
+        <p:nvSpPr>
           <p:cNvPr id="117762" name="Espace réservé de l'image des diapositives 1"/>
           <p:cNvSpPr>
             <a:spLocks noGrp="1" noRot="1" noChangeAspect="1" noTextEdit="1"/>
@@ -824,7 +1080,7 @@
             <a:fld id="{10ACC852-FC97-4FDE-92C8-D0F63EDFB18C}" type="slidenum">
               <a:rPr lang="fr-FR" altLang="fr-FR"/>
               <a:pPr/>
-              <a:t>26</a:t>
+              <a:t>27</a:t>
             </a:fld>
             <a:endParaRPr lang="fr-FR" altLang="fr-FR"/>
           </a:p>
@@ -843,7 +1099,7 @@
 </p:notes>
 </file>
 
-<file path=ppt/notesSlides/notesSlide11.xml><?xml version="1.0" encoding="utf-8"?>
+<file path=ppt/notesSlides/notesSlide12.xml><?xml version="1.0" encoding="utf-8"?>
 <p:notes xmlns:a="http://schemas.openxmlformats.org/drawingml/2006/main" xmlns:r="http://schemas.openxmlformats.org/officeDocument/2006/relationships" xmlns:p="http://schemas.openxmlformats.org/presentationml/2006/main">
   <p:cSld>
     <p:spTree>
@@ -1094,7 +1350,7 @@
             <a:fld id="{1F64F7EC-DB9F-46A5-B64A-DBB9FFB03107}" type="slidenum">
               <a:rPr lang="fr-FR" altLang="fr-FR"/>
               <a:pPr/>
-              <a:t>27</a:t>
+              <a:t>28</a:t>
             </a:fld>
             <a:endParaRPr lang="fr-FR" altLang="fr-FR"/>
           </a:p>
@@ -1132,6 +1388,100 @@
       </p:grpSpPr>
       <p:sp>
         <p:nvSpPr>
+          <p:cNvPr id="2" name="Espace réservé de l'image des diapositives 1"/>
+          <p:cNvSpPr>
+            <a:spLocks noGrp="1" noRot="1" noChangeAspect="1"/>
+          </p:cNvSpPr>
+          <p:nvPr>
+            <p:ph type="sldImg"/>
+          </p:nvPr>
+        </p:nvSpPr>
+        <p:spPr/>
+      </p:sp>
+      <p:sp>
+        <p:nvSpPr>
+          <p:cNvPr id="3" name="Espace réservé des commentaires 2"/>
+          <p:cNvSpPr>
+            <a:spLocks noGrp="1"/>
+          </p:cNvSpPr>
+          <p:nvPr>
+            <p:ph type="body" idx="1"/>
+          </p:nvPr>
+        </p:nvSpPr>
+        <p:spPr/>
+        <p:txBody>
+          <a:bodyPr/>
+          <a:lstStyle/>
+          <a:p>
+            <a:r>
+              <a:rPr lang="fr-FR" dirty="0" smtClean="0"/>
+              <a:t>https://www.azavea.com/blog/2015/12/21/tools-for-getting-data-out-of-openstreetmap-and-into-desktop-gis/</a:t>
+            </a:r>
+          </a:p>
+          <a:p>
+            <a:r>
+              <a:rPr lang="fr-FR" smtClean="0"/>
+              <a:t>https://land.copernicus.eu/imagery-in-situ/eu-dem/eu-dem-v1.1?tab=mapview</a:t>
+            </a:r>
+            <a:endParaRPr lang="fr-FR" dirty="0"/>
+          </a:p>
+        </p:txBody>
+      </p:sp>
+      <p:sp>
+        <p:nvSpPr>
+          <p:cNvPr id="4" name="Espace réservé du numéro de diapositive 3"/>
+          <p:cNvSpPr>
+            <a:spLocks noGrp="1"/>
+          </p:cNvSpPr>
+          <p:nvPr>
+            <p:ph type="sldNum" sz="quarter" idx="10"/>
+          </p:nvPr>
+        </p:nvSpPr>
+        <p:spPr/>
+        <p:txBody>
+          <a:bodyPr/>
+          <a:lstStyle/>
+          <a:p>
+            <a:fld id="{1321DB9F-BB1B-4B09-A1A4-736F1DCF5FB6}" type="slidenum">
+              <a:rPr lang="fr-FR" smtClean="0"/>
+              <a:t>6</a:t>
+            </a:fld>
+            <a:endParaRPr lang="fr-FR"/>
+          </a:p>
+        </p:txBody>
+      </p:sp>
+    </p:spTree>
+    <p:extLst>
+      <p:ext uri="{BB962C8B-B14F-4D97-AF65-F5344CB8AC3E}">
+        <p14:creationId xmlns:p14="http://schemas.microsoft.com/office/powerpoint/2010/main" val="3822050649"/>
+      </p:ext>
+    </p:extLst>
+  </p:cSld>
+  <p:clrMapOvr>
+    <a:masterClrMapping/>
+  </p:clrMapOvr>
+</p:notes>
+</file>
+
+<file path=ppt/notesSlides/notesSlide3.xml><?xml version="1.0" encoding="utf-8"?>
+<p:notes xmlns:a="http://schemas.openxmlformats.org/drawingml/2006/main" xmlns:r="http://schemas.openxmlformats.org/officeDocument/2006/relationships" xmlns:p="http://schemas.openxmlformats.org/presentationml/2006/main">
+  <p:cSld>
+    <p:spTree>
+      <p:nvGrpSpPr>
+        <p:cNvPr id="1" name=""/>
+        <p:cNvGrpSpPr/>
+        <p:nvPr/>
+      </p:nvGrpSpPr>
+      <p:grpSpPr>
+        <a:xfrm>
+          <a:off x="0" y="0"/>
+          <a:ext cx="0" cy="0"/>
+          <a:chOff x="0" y="0"/>
+          <a:chExt cx="0" cy="0"/>
+        </a:xfrm>
+      </p:grpSpPr>
+      <p:sp>
+        <p:nvSpPr>
           <p:cNvPr id="151554" name="Espace réservé de l'image des diapositives 1"/>
           <p:cNvSpPr>
             <a:spLocks noGrp="1" noRot="1" noChangeAspect="1" noTextEdit="1"/>
@@ -1350,7 +1700,7 @@
             <a:fld id="{FFA2A086-7015-4C97-BA6D-D976F45991F9}" type="slidenum">
               <a:rPr lang="fr-FR" altLang="fr-FR" smtClean="0"/>
               <a:pPr/>
-              <a:t>16</a:t>
+              <a:t>17</a:t>
             </a:fld>
             <a:endParaRPr lang="fr-FR" altLang="fr-FR"/>
           </a:p>
@@ -1369,7 +1719,7 @@
 </p:notes>
 </file>
 
-<file path=ppt/notesSlides/notesSlide3.xml><?xml version="1.0" encoding="utf-8"?>
+<file path=ppt/notesSlides/notesSlide4.xml><?xml version="1.0" encoding="utf-8"?>
 <p:notes xmlns:a="http://schemas.openxmlformats.org/drawingml/2006/main" xmlns:r="http://schemas.openxmlformats.org/officeDocument/2006/relationships" xmlns:p="http://schemas.openxmlformats.org/presentationml/2006/main">
   <p:cSld>
     <p:spTree>
@@ -1603,7 +1953,7 @@
             <a:fld id="{01957912-63F7-4A8E-AE6F-FA2BEB0C3766}" type="slidenum">
               <a:rPr lang="fr-FR" altLang="fr-FR" smtClean="0"/>
               <a:pPr/>
-              <a:t>17</a:t>
+              <a:t>18</a:t>
             </a:fld>
             <a:endParaRPr lang="fr-FR" altLang="fr-FR"/>
           </a:p>
@@ -1622,7 +1972,7 @@
 </p:notes>
 </file>
 
-<file path=ppt/notesSlides/notesSlide4.xml><?xml version="1.0" encoding="utf-8"?>
+<file path=ppt/notesSlides/notesSlide5.xml><?xml version="1.0" encoding="utf-8"?>
 <p:notes xmlns:a="http://schemas.openxmlformats.org/drawingml/2006/main" xmlns:r="http://schemas.openxmlformats.org/officeDocument/2006/relationships" xmlns:p="http://schemas.openxmlformats.org/presentationml/2006/main">
   <p:cSld>
     <p:spTree>
@@ -1784,7 +2134,7 @@
             <a:fld id="{F03B3D9B-304E-4593-8A8D-5C27BDC7C2FE}" type="slidenum">
               <a:rPr lang="fr-FR" altLang="fr-FR" sz="1200"/>
               <a:pPr algn="r" eaLnBrk="1" hangingPunct="1"/>
-              <a:t>19</a:t>
+              <a:t>20</a:t>
             </a:fld>
             <a:endParaRPr lang="fr-FR" altLang="fr-FR" sz="1200"/>
           </a:p>
@@ -1935,7 +2285,7 @@
             <a:fld id="{484FC898-948F-4235-BA58-329820EBA4AE}" type="slidenum">
               <a:rPr lang="fr-FR" altLang="fr-FR" sz="1200"/>
               <a:pPr algn="r" eaLnBrk="1" hangingPunct="1"/>
-              <a:t>19</a:t>
+              <a:t>20</a:t>
             </a:fld>
             <a:endParaRPr lang="fr-FR" altLang="fr-FR" sz="1200"/>
           </a:p>
@@ -2036,7 +2386,7 @@
 </p:notes>
 </file>
 
-<file path=ppt/notesSlides/notesSlide5.xml><?xml version="1.0" encoding="utf-8"?>
+<file path=ppt/notesSlides/notesSlide6.xml><?xml version="1.0" encoding="utf-8"?>
 <p:notes xmlns:a="http://schemas.openxmlformats.org/drawingml/2006/main" xmlns:r="http://schemas.openxmlformats.org/officeDocument/2006/relationships" xmlns:p="http://schemas.openxmlformats.org/presentationml/2006/main">
   <p:cSld>
     <p:spTree>
@@ -2148,7 +2498,7 @@
 </p:notes>
 </file>
 
-<file path=ppt/notesSlides/notesSlide6.xml><?xml version="1.0" encoding="utf-8"?>
+<file path=ppt/notesSlides/notesSlide7.xml><?xml version="1.0" encoding="utf-8"?>
 <p:notes xmlns:a="http://schemas.openxmlformats.org/drawingml/2006/main" xmlns:r="http://schemas.openxmlformats.org/officeDocument/2006/relationships" xmlns:p="http://schemas.openxmlformats.org/presentationml/2006/main">
   <p:cSld>
     <p:spTree>
@@ -2260,7 +2610,7 @@
 </p:notes>
 </file>
 
-<file path=ppt/notesSlides/notesSlide7.xml><?xml version="1.0" encoding="utf-8"?>
+<file path=ppt/notesSlides/notesSlide8.xml><?xml version="1.0" encoding="utf-8"?>
 <p:notes xmlns:a="http://schemas.openxmlformats.org/drawingml/2006/main" xmlns:r="http://schemas.openxmlformats.org/officeDocument/2006/relationships" xmlns:p="http://schemas.openxmlformats.org/presentationml/2006/main">
   <p:cSld>
     <p:spTree>
@@ -2494,7 +2844,7 @@
             <a:fld id="{D4C598FC-A51A-4C10-BC7E-08C80E287FDA}" type="slidenum">
               <a:rPr lang="fr-FR" altLang="fr-FR" smtClean="0"/>
               <a:pPr/>
-              <a:t>22</a:t>
+              <a:t>23</a:t>
             </a:fld>
             <a:endParaRPr lang="fr-FR" altLang="fr-FR"/>
           </a:p>
@@ -2513,7 +2863,7 @@
 </p:notes>
 </file>
 
-<file path=ppt/notesSlides/notesSlide8.xml><?xml version="1.0" encoding="utf-8"?>
+<file path=ppt/notesSlides/notesSlide9.xml><?xml version="1.0" encoding="utf-8"?>
 <p:notes xmlns:a="http://schemas.openxmlformats.org/drawingml/2006/main" xmlns:r="http://schemas.openxmlformats.org/officeDocument/2006/relationships" xmlns:p="http://schemas.openxmlformats.org/presentationml/2006/main">
   <p:cSld>
     <p:spTree>
@@ -2752,7 +3102,7 @@
             <a:fld id="{10ACC852-FC97-4FDE-92C8-D0F63EDFB18C}" type="slidenum">
               <a:rPr lang="fr-FR" altLang="fr-FR"/>
               <a:pPr/>
-              <a:t>24</a:t>
+              <a:t>25</a:t>
             </a:fld>
             <a:endParaRPr lang="fr-FR" altLang="fr-FR"/>
           </a:p>
@@ -2762,261 +3112,6 @@
     <p:extLst>
       <p:ext uri="{BB962C8B-B14F-4D97-AF65-F5344CB8AC3E}">
         <p14:creationId xmlns:p14="http://schemas.microsoft.com/office/powerpoint/2010/main" val="1053240287"/>
-      </p:ext>
-    </p:extLst>
-  </p:cSld>
-  <p:clrMapOvr>
-    <a:masterClrMapping/>
-  </p:clrMapOvr>
-</p:notes>
-</file>
-
-<file path=ppt/notesSlides/notesSlide9.xml><?xml version="1.0" encoding="utf-8"?>
-<p:notes xmlns:a="http://schemas.openxmlformats.org/drawingml/2006/main" xmlns:r="http://schemas.openxmlformats.org/officeDocument/2006/relationships" xmlns:p="http://schemas.openxmlformats.org/presentationml/2006/main">
-  <p:cSld>
-    <p:spTree>
-      <p:nvGrpSpPr>
-        <p:cNvPr id="1" name=""/>
-        <p:cNvGrpSpPr/>
-        <p:nvPr/>
-      </p:nvGrpSpPr>
-      <p:grpSpPr>
-        <a:xfrm>
-          <a:off x="0" y="0"/>
-          <a:ext cx="0" cy="0"/>
-          <a:chOff x="0" y="0"/>
-          <a:chExt cx="0" cy="0"/>
-        </a:xfrm>
-      </p:grpSpPr>
-      <p:sp>
-        <p:nvSpPr>
-          <p:cNvPr id="124930" name="Espace réservé de l'image des diapositives 1"/>
-          <p:cNvSpPr>
-            <a:spLocks noGrp="1" noRot="1" noChangeAspect="1"/>
-          </p:cNvSpPr>
-          <p:nvPr>
-            <p:ph type="sldImg"/>
-          </p:nvPr>
-        </p:nvSpPr>
-        <p:spPr bwMode="auto">
-          <a:xfrm>
-            <a:off x="917575" y="744538"/>
-            <a:ext cx="4962525" cy="3722687"/>
-          </a:xfrm>
-          <a:prstGeom prst="rect">
-            <a:avLst/>
-          </a:prstGeom>
-          <a:noFill/>
-          <a:ln w="12700">
-            <a:solidFill>
-              <a:srgbClr val="000000"/>
-            </a:solidFill>
-            <a:miter lim="800000"/>
-            <a:headEnd/>
-            <a:tailEnd/>
-          </a:ln>
-          <a:extLst>
-            <a:ext uri="{909E8E84-426E-40DD-AFC4-6F175D3DCCD1}">
-              <a14:hiddenFill xmlns:a14="http://schemas.microsoft.com/office/drawing/2010/main">
-                <a:solidFill>
-                  <a:srgbClr val="FFFFFF"/>
-                </a:solidFill>
-              </a14:hiddenFill>
-            </a:ext>
-          </a:extLst>
-        </p:spPr>
-      </p:sp>
-      <p:sp>
-        <p:nvSpPr>
-          <p:cNvPr id="124931" name="Espace réservé des commentaires 2"/>
-          <p:cNvSpPr>
-            <a:spLocks noGrp="1"/>
-          </p:cNvSpPr>
-          <p:nvPr>
-            <p:ph type="body" idx="1"/>
-          </p:nvPr>
-        </p:nvSpPr>
-        <p:spPr>
-          <a:noFill/>
-          <a:extLst>
-            <a:ext uri="{909E8E84-426E-40DD-AFC4-6F175D3DCCD1}">
-              <a14:hiddenFill xmlns:a14="http://schemas.microsoft.com/office/drawing/2010/main">
-                <a:solidFill>
-                  <a:srgbClr val="FFFFFF"/>
-                </a:solidFill>
-              </a14:hiddenFill>
-            </a:ext>
-            <a:ext uri="{91240B29-F687-4F45-9708-019B960494DF}">
-              <a14:hiddenLine xmlns:a14="http://schemas.microsoft.com/office/drawing/2010/main" w="9525">
-                <a:solidFill>
-                  <a:srgbClr val="000000"/>
-                </a:solidFill>
-                <a:miter lim="800000"/>
-                <a:headEnd/>
-                <a:tailEnd/>
-              </a14:hiddenLine>
-            </a:ext>
-          </a:extLst>
-        </p:spPr>
-        <p:txBody>
-          <a:bodyPr/>
-          <a:lstStyle/>
-          <a:p>
-            <a:r>
-              <a:rPr lang="fr-FR" altLang="fr-FR">
-                <a:latin typeface="Arial" panose="020B0604020202020204" pitchFamily="34" charset="0"/>
-              </a:rPr>
-              <a:t>Cartographie réalisée sur le théatre (MGCP) téléchargeable sur le site du 28GG </a:t>
-            </a:r>
-          </a:p>
-        </p:txBody>
-      </p:sp>
-      <p:sp>
-        <p:nvSpPr>
-          <p:cNvPr id="124932" name="Espace réservé du numéro de diapositive 3"/>
-          <p:cNvSpPr>
-            <a:spLocks noGrp="1"/>
-          </p:cNvSpPr>
-          <p:nvPr>
-            <p:ph type="sldNum" sz="quarter" idx="5"/>
-          </p:nvPr>
-        </p:nvSpPr>
-        <p:spPr>
-          <a:noFill/>
-          <a:extLst>
-            <a:ext uri="{909E8E84-426E-40DD-AFC4-6F175D3DCCD1}">
-              <a14:hiddenFill xmlns:a14="http://schemas.microsoft.com/office/drawing/2010/main">
-                <a:solidFill>
-                  <a:srgbClr val="FFFFFF"/>
-                </a:solidFill>
-              </a14:hiddenFill>
-            </a:ext>
-            <a:ext uri="{91240B29-F687-4F45-9708-019B960494DF}">
-              <a14:hiddenLine xmlns:a14="http://schemas.microsoft.com/office/drawing/2010/main" w="9525">
-                <a:solidFill>
-                  <a:srgbClr val="000000"/>
-                </a:solidFill>
-                <a:miter lim="800000"/>
-                <a:headEnd/>
-                <a:tailEnd/>
-              </a14:hiddenLine>
-            </a:ext>
-          </a:extLst>
-        </p:spPr>
-        <p:txBody>
-          <a:bodyPr/>
-          <a:lstStyle>
-            <a:lvl1pPr defTabSz="920750">
-              <a:defRPr>
-                <a:solidFill>
-                  <a:schemeClr val="tx1"/>
-                </a:solidFill>
-                <a:latin typeface="Arial" panose="020B0604020202020204" pitchFamily="34" charset="0"/>
-              </a:defRPr>
-            </a:lvl1pPr>
-            <a:lvl2pPr marL="742950" indent="-285750" defTabSz="920750">
-              <a:defRPr>
-                <a:solidFill>
-                  <a:schemeClr val="tx1"/>
-                </a:solidFill>
-                <a:latin typeface="Arial" panose="020B0604020202020204" pitchFamily="34" charset="0"/>
-              </a:defRPr>
-            </a:lvl2pPr>
-            <a:lvl3pPr marL="1143000" indent="-228600" defTabSz="920750">
-              <a:defRPr>
-                <a:solidFill>
-                  <a:schemeClr val="tx1"/>
-                </a:solidFill>
-                <a:latin typeface="Arial" panose="020B0604020202020204" pitchFamily="34" charset="0"/>
-              </a:defRPr>
-            </a:lvl3pPr>
-            <a:lvl4pPr marL="1600200" indent="-228600" defTabSz="920750">
-              <a:defRPr>
-                <a:solidFill>
-                  <a:schemeClr val="tx1"/>
-                </a:solidFill>
-                <a:latin typeface="Arial" panose="020B0604020202020204" pitchFamily="34" charset="0"/>
-              </a:defRPr>
-            </a:lvl4pPr>
-            <a:lvl5pPr marL="2057400" indent="-228600" defTabSz="920750">
-              <a:defRPr>
-                <a:solidFill>
-                  <a:schemeClr val="tx1"/>
-                </a:solidFill>
-                <a:latin typeface="Arial" panose="020B0604020202020204" pitchFamily="34" charset="0"/>
-              </a:defRPr>
-            </a:lvl5pPr>
-            <a:lvl6pPr marL="2514600" indent="-228600" defTabSz="920750" eaLnBrk="0" fontAlgn="base" hangingPunct="0">
-              <a:spcBef>
-                <a:spcPct val="0"/>
-              </a:spcBef>
-              <a:spcAft>
-                <a:spcPct val="0"/>
-              </a:spcAft>
-              <a:defRPr>
-                <a:solidFill>
-                  <a:schemeClr val="tx1"/>
-                </a:solidFill>
-                <a:latin typeface="Arial" panose="020B0604020202020204" pitchFamily="34" charset="0"/>
-              </a:defRPr>
-            </a:lvl6pPr>
-            <a:lvl7pPr marL="2971800" indent="-228600" defTabSz="920750" eaLnBrk="0" fontAlgn="base" hangingPunct="0">
-              <a:spcBef>
-                <a:spcPct val="0"/>
-              </a:spcBef>
-              <a:spcAft>
-                <a:spcPct val="0"/>
-              </a:spcAft>
-              <a:defRPr>
-                <a:solidFill>
-                  <a:schemeClr val="tx1"/>
-                </a:solidFill>
-                <a:latin typeface="Arial" panose="020B0604020202020204" pitchFamily="34" charset="0"/>
-              </a:defRPr>
-            </a:lvl7pPr>
-            <a:lvl8pPr marL="3429000" indent="-228600" defTabSz="920750" eaLnBrk="0" fontAlgn="base" hangingPunct="0">
-              <a:spcBef>
-                <a:spcPct val="0"/>
-              </a:spcBef>
-              <a:spcAft>
-                <a:spcPct val="0"/>
-              </a:spcAft>
-              <a:defRPr>
-                <a:solidFill>
-                  <a:schemeClr val="tx1"/>
-                </a:solidFill>
-                <a:latin typeface="Arial" panose="020B0604020202020204" pitchFamily="34" charset="0"/>
-              </a:defRPr>
-            </a:lvl8pPr>
-            <a:lvl9pPr marL="3886200" indent="-228600" defTabSz="920750" eaLnBrk="0" fontAlgn="base" hangingPunct="0">
-              <a:spcBef>
-                <a:spcPct val="0"/>
-              </a:spcBef>
-              <a:spcAft>
-                <a:spcPct val="0"/>
-              </a:spcAft>
-              <a:defRPr>
-                <a:solidFill>
-                  <a:schemeClr val="tx1"/>
-                </a:solidFill>
-                <a:latin typeface="Arial" panose="020B0604020202020204" pitchFamily="34" charset="0"/>
-              </a:defRPr>
-            </a:lvl9pPr>
-          </a:lstStyle>
-          <a:p>
-            <a:fld id="{024FE29A-0FFA-4EAC-A640-10268E671FEF}" type="slidenum">
-              <a:rPr lang="fr-FR" altLang="fr-FR"/>
-              <a:pPr/>
-              <a:t>25</a:t>
-            </a:fld>
-            <a:endParaRPr lang="fr-FR" altLang="fr-FR"/>
-          </a:p>
-        </p:txBody>
-      </p:sp>
-    </p:spTree>
-    <p:extLst>
-      <p:ext uri="{BB962C8B-B14F-4D97-AF65-F5344CB8AC3E}">
-        <p14:creationId xmlns:p14="http://schemas.microsoft.com/office/powerpoint/2010/main" val="486725490"/>
       </p:ext>
     </p:extLst>
   </p:cSld>
@@ -3060,7 +3155,7 @@
           <a:p>
             <a:fld id="{60184FBF-4AF8-4639-B60E-CD3D72474494}" type="datetimeFigureOut">
               <a:rPr lang="fr-FR" smtClean="0"/>
-              <a:t>10/05/2021</a:t>
+              <a:t>29/05/2021</a:t>
             </a:fld>
             <a:endParaRPr lang="fr-FR"/>
           </a:p>
@@ -3273,7 +3368,7 @@
           <a:p>
             <a:fld id="{60184FBF-4AF8-4639-B60E-CD3D72474494}" type="datetimeFigureOut">
               <a:rPr lang="fr-FR" smtClean="0"/>
-              <a:t>10/05/2021</a:t>
+              <a:t>29/05/2021</a:t>
             </a:fld>
             <a:endParaRPr lang="fr-FR"/>
           </a:p>
@@ -3906,14 +4001,14 @@
       </p:sp>
       <p:sp>
         <p:nvSpPr>
-          <p:cNvPr id="6" name="ZoneTexte 5"/>
+          <p:cNvPr id="5" name="ZoneTexte 4"/>
           <p:cNvSpPr txBox="1"/>
           <p:nvPr/>
         </p:nvSpPr>
         <p:spPr>
           <a:xfrm>
-            <a:off x="243400" y="6220918"/>
-            <a:ext cx="3462871" cy="369332"/>
+            <a:off x="1056485" y="5637605"/>
+            <a:ext cx="7031027" cy="923330"/>
           </a:xfrm>
           <a:prstGeom prst="rect">
             <a:avLst/>
@@ -3928,7 +4023,35 @@
           <a:p>
             <a:r>
               <a:rPr lang="fr-FR" dirty="0" smtClean="0"/>
-              <a:t>Résultat avec le niveau de zoom 17</a:t>
+              <a:t>L’onglet Assembler permet d’exporter la </a:t>
+            </a:r>
+            <a:r>
+              <a:rPr lang="fr-FR" dirty="0" err="1" smtClean="0"/>
+              <a:t>carto</a:t>
+            </a:r>
+            <a:r>
+              <a:rPr lang="fr-FR" dirty="0" smtClean="0"/>
+              <a:t> dans un format exploitable</a:t>
+            </a:r>
+          </a:p>
+          <a:p>
+            <a:pPr marL="285750" indent="-285750">
+              <a:buFontTx/>
+              <a:buChar char="-"/>
+            </a:pPr>
+            <a:r>
+              <a:rPr lang="fr-FR" dirty="0" smtClean="0"/>
+              <a:t>Choisir la carte, le niveau de zoom</a:t>
+            </a:r>
+          </a:p>
+          <a:p>
+            <a:pPr marL="285750" indent="-285750">
+              <a:buFontTx/>
+              <a:buChar char="-"/>
+            </a:pPr>
+            <a:r>
+              <a:rPr lang="fr-FR" dirty="0" smtClean="0"/>
+              <a:t>Il est possible de découper la carte si elle est imposante</a:t>
             </a:r>
             <a:endParaRPr lang="fr-FR" dirty="0"/>
           </a:p>
@@ -3936,7 +4059,7 @@
       </p:sp>
       <p:pic>
         <p:nvPicPr>
-          <p:cNvPr id="4" name="Image 3"/>
+          <p:cNvPr id="2" name="Image 1"/>
           <p:cNvPicPr>
             <a:picLocks noChangeAspect="1"/>
           </p:cNvPicPr>
@@ -3950,8 +4073,8 @@
         </p:blipFill>
         <p:spPr>
           <a:xfrm>
-            <a:off x="1104796" y="1250049"/>
-            <a:ext cx="6934408" cy="4708549"/>
+            <a:off x="2290760" y="1502917"/>
+            <a:ext cx="4562475" cy="3619500"/>
           </a:xfrm>
           <a:prstGeom prst="rect">
             <a:avLst/>
@@ -3966,7 +4089,7 @@
     </p:spTree>
     <p:extLst>
       <p:ext uri="{BB962C8B-B14F-4D97-AF65-F5344CB8AC3E}">
-        <p14:creationId xmlns:p14="http://schemas.microsoft.com/office/powerpoint/2010/main" val="632001234"/>
+        <p14:creationId xmlns:p14="http://schemas.microsoft.com/office/powerpoint/2010/main" val="3076171619"/>
       </p:ext>
     </p:extLst>
   </p:cSld>
@@ -3995,6 +4118,130 @@
       </p:grpSpPr>
       <p:sp>
         <p:nvSpPr>
+          <p:cNvPr id="3" name="ZoneTexte 2"/>
+          <p:cNvSpPr txBox="1"/>
+          <p:nvPr/>
+        </p:nvSpPr>
+        <p:spPr>
+          <a:xfrm>
+            <a:off x="0" y="402955"/>
+            <a:ext cx="9144000" cy="584775"/>
+          </a:xfrm>
+          <a:prstGeom prst="rect">
+            <a:avLst/>
+          </a:prstGeom>
+          <a:noFill/>
+        </p:spPr>
+        <p:txBody>
+          <a:bodyPr wrap="square" rtlCol="0">
+            <a:spAutoFit/>
+          </a:bodyPr>
+          <a:lstStyle/>
+          <a:p>
+            <a:pPr algn="ctr"/>
+            <a:r>
+              <a:rPr lang="fr-FR" sz="3200" dirty="0" smtClean="0"/>
+              <a:t>Exporter depuis SAS </a:t>
+            </a:r>
+            <a:r>
+              <a:rPr lang="fr-FR" sz="3200" dirty="0" err="1" smtClean="0"/>
+              <a:t>Planet</a:t>
+            </a:r>
+            <a:endParaRPr lang="fr-FR" sz="3200" dirty="0"/>
+          </a:p>
+        </p:txBody>
+      </p:sp>
+      <p:sp>
+        <p:nvSpPr>
+          <p:cNvPr id="6" name="ZoneTexte 5"/>
+          <p:cNvSpPr txBox="1"/>
+          <p:nvPr/>
+        </p:nvSpPr>
+        <p:spPr>
+          <a:xfrm>
+            <a:off x="243400" y="6220918"/>
+            <a:ext cx="3462871" cy="369332"/>
+          </a:xfrm>
+          <a:prstGeom prst="rect">
+            <a:avLst/>
+          </a:prstGeom>
+          <a:noFill/>
+        </p:spPr>
+        <p:txBody>
+          <a:bodyPr wrap="none" rtlCol="0">
+            <a:spAutoFit/>
+          </a:bodyPr>
+          <a:lstStyle/>
+          <a:p>
+            <a:r>
+              <a:rPr lang="fr-FR" dirty="0" smtClean="0"/>
+              <a:t>Résultat avec le niveau de zoom 17</a:t>
+            </a:r>
+            <a:endParaRPr lang="fr-FR" dirty="0"/>
+          </a:p>
+        </p:txBody>
+      </p:sp>
+      <p:pic>
+        <p:nvPicPr>
+          <p:cNvPr id="4" name="Image 3"/>
+          <p:cNvPicPr>
+            <a:picLocks noChangeAspect="1"/>
+          </p:cNvPicPr>
+          <p:nvPr/>
+        </p:nvPicPr>
+        <p:blipFill>
+          <a:blip r:embed="rId2"/>
+          <a:stretch>
+            <a:fillRect/>
+          </a:stretch>
+        </p:blipFill>
+        <p:spPr>
+          <a:xfrm>
+            <a:off x="1104796" y="1250049"/>
+            <a:ext cx="6934408" cy="4708549"/>
+          </a:xfrm>
+          <a:prstGeom prst="rect">
+            <a:avLst/>
+          </a:prstGeom>
+          <a:ln>
+            <a:solidFill>
+              <a:schemeClr val="tx1"/>
+            </a:solidFill>
+          </a:ln>
+        </p:spPr>
+      </p:pic>
+    </p:spTree>
+    <p:extLst>
+      <p:ext uri="{BB962C8B-B14F-4D97-AF65-F5344CB8AC3E}">
+        <p14:creationId xmlns:p14="http://schemas.microsoft.com/office/powerpoint/2010/main" val="632001234"/>
+      </p:ext>
+    </p:extLst>
+  </p:cSld>
+  <p:clrMapOvr>
+    <a:masterClrMapping/>
+  </p:clrMapOvr>
+</p:sld>
+</file>
+
+<file path=ppt/slides/slide12.xml><?xml version="1.0" encoding="utf-8"?>
+<p:sld xmlns:a="http://schemas.openxmlformats.org/drawingml/2006/main" xmlns:r="http://schemas.openxmlformats.org/officeDocument/2006/relationships" xmlns:p="http://schemas.openxmlformats.org/presentationml/2006/main">
+  <p:cSld>
+    <p:spTree>
+      <p:nvGrpSpPr>
+        <p:cNvPr id="1" name=""/>
+        <p:cNvGrpSpPr/>
+        <p:nvPr/>
+      </p:nvGrpSpPr>
+      <p:grpSpPr>
+        <a:xfrm>
+          <a:off x="0" y="0"/>
+          <a:ext cx="0" cy="0"/>
+          <a:chOff x="0" y="0"/>
+          <a:chExt cx="0" cy="0"/>
+        </a:xfrm>
+      </p:grpSpPr>
+      <p:sp>
+        <p:nvSpPr>
           <p:cNvPr id="2" name="Rectangle 1"/>
           <p:cNvSpPr/>
           <p:nvPr/>
@@ -4152,7 +4399,7 @@
 </p:sld>
 </file>
 
-<file path=ppt/slides/slide12.xml><?xml version="1.0" encoding="utf-8"?>
+<file path=ppt/slides/slide13.xml><?xml version="1.0" encoding="utf-8"?>
 <p:sld xmlns:a="http://schemas.openxmlformats.org/drawingml/2006/main" xmlns:r="http://schemas.openxmlformats.org/officeDocument/2006/relationships" xmlns:p="http://schemas.openxmlformats.org/presentationml/2006/main">
   <p:cSld>
     <p:spTree>
@@ -4334,7 +4581,7 @@
 </p:sld>
 </file>
 
-<file path=ppt/slides/slide13.xml><?xml version="1.0" encoding="utf-8"?>
+<file path=ppt/slides/slide14.xml><?xml version="1.0" encoding="utf-8"?>
 <p:sld xmlns:a="http://schemas.openxmlformats.org/drawingml/2006/main" xmlns:r="http://schemas.openxmlformats.org/officeDocument/2006/relationships" xmlns:p="http://schemas.openxmlformats.org/presentationml/2006/main">
   <p:cSld>
     <p:spTree>
@@ -4415,161 +4662,6 @@
     <p:extLst>
       <p:ext uri="{BB962C8B-B14F-4D97-AF65-F5344CB8AC3E}">
         <p14:creationId xmlns:p14="http://schemas.microsoft.com/office/powerpoint/2010/main" val="1615496566"/>
-      </p:ext>
-    </p:extLst>
-  </p:cSld>
-  <p:clrMapOvr>
-    <a:masterClrMapping/>
-  </p:clrMapOvr>
-</p:sld>
-</file>
-
-<file path=ppt/slides/slide14.xml><?xml version="1.0" encoding="utf-8"?>
-<p:sld xmlns:a="http://schemas.openxmlformats.org/drawingml/2006/main" xmlns:r="http://schemas.openxmlformats.org/officeDocument/2006/relationships" xmlns:p="http://schemas.openxmlformats.org/presentationml/2006/main">
-  <p:cSld>
-    <p:spTree>
-      <p:nvGrpSpPr>
-        <p:cNvPr id="1" name=""/>
-        <p:cNvGrpSpPr/>
-        <p:nvPr/>
-      </p:nvGrpSpPr>
-      <p:grpSpPr>
-        <a:xfrm>
-          <a:off x="0" y="0"/>
-          <a:ext cx="0" cy="0"/>
-          <a:chOff x="0" y="0"/>
-          <a:chExt cx="0" cy="0"/>
-        </a:xfrm>
-      </p:grpSpPr>
-      <p:sp>
-        <p:nvSpPr>
-          <p:cNvPr id="3" name="ZoneTexte 2"/>
-          <p:cNvSpPr txBox="1"/>
-          <p:nvPr/>
-        </p:nvSpPr>
-        <p:spPr>
-          <a:xfrm>
-            <a:off x="632232" y="1528550"/>
-            <a:ext cx="8156168" cy="1631216"/>
-          </a:xfrm>
-          <a:prstGeom prst="rect">
-            <a:avLst/>
-          </a:prstGeom>
-          <a:noFill/>
-        </p:spPr>
-        <p:txBody>
-          <a:bodyPr wrap="square" rtlCol="0">
-            <a:spAutoFit/>
-          </a:bodyPr>
-          <a:lstStyle/>
-          <a:p>
-            <a:pPr marL="285750" indent="-285750">
-              <a:buFontTx/>
-              <a:buChar char="-"/>
-            </a:pPr>
-            <a:r>
-              <a:rPr lang="fr-FR" sz="2000" dirty="0" smtClean="0"/>
-              <a:t>Afficher dans </a:t>
-            </a:r>
-            <a:r>
-              <a:rPr lang="fr-FR" sz="2000" dirty="0" err="1" smtClean="0"/>
-              <a:t>GlobalMapper</a:t>
-            </a:r>
-            <a:r>
-              <a:rPr lang="fr-FR" sz="2000" dirty="0" smtClean="0"/>
-              <a:t> la zone voulue</a:t>
-            </a:r>
-          </a:p>
-          <a:p>
-            <a:pPr marL="285750" indent="-285750">
-              <a:buFontTx/>
-              <a:buChar char="-"/>
-            </a:pPr>
-            <a:r>
-              <a:rPr lang="fr-FR" sz="2000" dirty="0" smtClean="0"/>
-              <a:t>Clic droit sur la couche -&gt; Couche -&gt; Exporter</a:t>
-            </a:r>
-          </a:p>
-          <a:p>
-            <a:pPr marL="285750" indent="-285750">
-              <a:buFontTx/>
-              <a:buChar char="-"/>
-            </a:pPr>
-            <a:r>
-              <a:rPr lang="fr-FR" sz="2000" dirty="0" smtClean="0"/>
-              <a:t>Choisir </a:t>
-            </a:r>
-            <a:r>
-              <a:rPr lang="fr-FR" sz="2000" dirty="0"/>
-              <a:t>le format </a:t>
-            </a:r>
-            <a:r>
-              <a:rPr lang="fr-FR" sz="2000" dirty="0" err="1" smtClean="0"/>
-              <a:t>GeoTiff</a:t>
-            </a:r>
-            <a:r>
-              <a:rPr lang="fr-FR" sz="2000" dirty="0" smtClean="0"/>
-              <a:t> ou ECW</a:t>
-            </a:r>
-          </a:p>
-          <a:p>
-            <a:pPr marL="285750" indent="-285750">
-              <a:buFontTx/>
-              <a:buChar char="-"/>
-            </a:pPr>
-            <a:r>
-              <a:rPr lang="fr-FR" sz="2000" dirty="0" smtClean="0"/>
-              <a:t>Dans « limites d’export », cocher « exporter les données visibles à l’écran !</a:t>
-            </a:r>
-          </a:p>
-          <a:p>
-            <a:pPr marL="285750" indent="-285750">
-              <a:buFontTx/>
-              <a:buChar char="-"/>
-            </a:pPr>
-            <a:r>
-              <a:rPr lang="fr-FR" sz="2000" dirty="0" smtClean="0"/>
-              <a:t>L’export peut prendre facilement 30min voire plusieurs heures</a:t>
-            </a:r>
-            <a:endParaRPr lang="fr-FR" sz="2000" dirty="0"/>
-          </a:p>
-        </p:txBody>
-      </p:sp>
-      <p:sp>
-        <p:nvSpPr>
-          <p:cNvPr id="4" name="ZoneTexte 3"/>
-          <p:cNvSpPr txBox="1"/>
-          <p:nvPr/>
-        </p:nvSpPr>
-        <p:spPr>
-          <a:xfrm>
-            <a:off x="0" y="402955"/>
-            <a:ext cx="9144000" cy="584775"/>
-          </a:xfrm>
-          <a:prstGeom prst="rect">
-            <a:avLst/>
-          </a:prstGeom>
-          <a:noFill/>
-        </p:spPr>
-        <p:txBody>
-          <a:bodyPr wrap="square" rtlCol="0">
-            <a:spAutoFit/>
-          </a:bodyPr>
-          <a:lstStyle/>
-          <a:p>
-            <a:pPr algn="ctr"/>
-            <a:r>
-              <a:rPr lang="fr-FR" sz="3200" dirty="0" smtClean="0"/>
-              <a:t>Exporter depuis un serveur de cartes</a:t>
-            </a:r>
-            <a:endParaRPr lang="fr-FR" sz="3200" dirty="0"/>
-          </a:p>
-        </p:txBody>
-      </p:sp>
-    </p:spTree>
-    <p:extLst>
-      <p:ext uri="{BB962C8B-B14F-4D97-AF65-F5344CB8AC3E}">
-        <p14:creationId xmlns:p14="http://schemas.microsoft.com/office/powerpoint/2010/main" val="2032598633"/>
       </p:ext>
     </p:extLst>
   </p:cSld>
@@ -4598,6 +4690,161 @@
       </p:grpSpPr>
       <p:sp>
         <p:nvSpPr>
+          <p:cNvPr id="3" name="ZoneTexte 2"/>
+          <p:cNvSpPr txBox="1"/>
+          <p:nvPr/>
+        </p:nvSpPr>
+        <p:spPr>
+          <a:xfrm>
+            <a:off x="632232" y="1528550"/>
+            <a:ext cx="8156168" cy="1631216"/>
+          </a:xfrm>
+          <a:prstGeom prst="rect">
+            <a:avLst/>
+          </a:prstGeom>
+          <a:noFill/>
+        </p:spPr>
+        <p:txBody>
+          <a:bodyPr wrap="square" rtlCol="0">
+            <a:spAutoFit/>
+          </a:bodyPr>
+          <a:lstStyle/>
+          <a:p>
+            <a:pPr marL="285750" indent="-285750">
+              <a:buFontTx/>
+              <a:buChar char="-"/>
+            </a:pPr>
+            <a:r>
+              <a:rPr lang="fr-FR" sz="2000" dirty="0" smtClean="0"/>
+              <a:t>Afficher dans </a:t>
+            </a:r>
+            <a:r>
+              <a:rPr lang="fr-FR" sz="2000" dirty="0" err="1" smtClean="0"/>
+              <a:t>GlobalMapper</a:t>
+            </a:r>
+            <a:r>
+              <a:rPr lang="fr-FR" sz="2000" dirty="0" smtClean="0"/>
+              <a:t> la zone voulue</a:t>
+            </a:r>
+          </a:p>
+          <a:p>
+            <a:pPr marL="285750" indent="-285750">
+              <a:buFontTx/>
+              <a:buChar char="-"/>
+            </a:pPr>
+            <a:r>
+              <a:rPr lang="fr-FR" sz="2000" dirty="0" smtClean="0"/>
+              <a:t>Clic droit sur la couche -&gt; Couche -&gt; Exporter</a:t>
+            </a:r>
+          </a:p>
+          <a:p>
+            <a:pPr marL="285750" indent="-285750">
+              <a:buFontTx/>
+              <a:buChar char="-"/>
+            </a:pPr>
+            <a:r>
+              <a:rPr lang="fr-FR" sz="2000" dirty="0" smtClean="0"/>
+              <a:t>Choisir </a:t>
+            </a:r>
+            <a:r>
+              <a:rPr lang="fr-FR" sz="2000" dirty="0"/>
+              <a:t>le format </a:t>
+            </a:r>
+            <a:r>
+              <a:rPr lang="fr-FR" sz="2000" dirty="0" err="1" smtClean="0"/>
+              <a:t>GeoTiff</a:t>
+            </a:r>
+            <a:r>
+              <a:rPr lang="fr-FR" sz="2000" dirty="0" smtClean="0"/>
+              <a:t> ou ECW</a:t>
+            </a:r>
+          </a:p>
+          <a:p>
+            <a:pPr marL="285750" indent="-285750">
+              <a:buFontTx/>
+              <a:buChar char="-"/>
+            </a:pPr>
+            <a:r>
+              <a:rPr lang="fr-FR" sz="2000" dirty="0" smtClean="0"/>
+              <a:t>Dans « limites d’export », cocher « exporter les données visibles à l’écran !</a:t>
+            </a:r>
+          </a:p>
+          <a:p>
+            <a:pPr marL="285750" indent="-285750">
+              <a:buFontTx/>
+              <a:buChar char="-"/>
+            </a:pPr>
+            <a:r>
+              <a:rPr lang="fr-FR" sz="2000" dirty="0" smtClean="0"/>
+              <a:t>L’export peut prendre facilement 30min voire plusieurs heures</a:t>
+            </a:r>
+            <a:endParaRPr lang="fr-FR" sz="2000" dirty="0"/>
+          </a:p>
+        </p:txBody>
+      </p:sp>
+      <p:sp>
+        <p:nvSpPr>
+          <p:cNvPr id="4" name="ZoneTexte 3"/>
+          <p:cNvSpPr txBox="1"/>
+          <p:nvPr/>
+        </p:nvSpPr>
+        <p:spPr>
+          <a:xfrm>
+            <a:off x="0" y="402955"/>
+            <a:ext cx="9144000" cy="584775"/>
+          </a:xfrm>
+          <a:prstGeom prst="rect">
+            <a:avLst/>
+          </a:prstGeom>
+          <a:noFill/>
+        </p:spPr>
+        <p:txBody>
+          <a:bodyPr wrap="square" rtlCol="0">
+            <a:spAutoFit/>
+          </a:bodyPr>
+          <a:lstStyle/>
+          <a:p>
+            <a:pPr algn="ctr"/>
+            <a:r>
+              <a:rPr lang="fr-FR" sz="3200" dirty="0" smtClean="0"/>
+              <a:t>Exporter depuis un serveur de cartes</a:t>
+            </a:r>
+            <a:endParaRPr lang="fr-FR" sz="3200" dirty="0"/>
+          </a:p>
+        </p:txBody>
+      </p:sp>
+    </p:spTree>
+    <p:extLst>
+      <p:ext uri="{BB962C8B-B14F-4D97-AF65-F5344CB8AC3E}">
+        <p14:creationId xmlns:p14="http://schemas.microsoft.com/office/powerpoint/2010/main" val="2032598633"/>
+      </p:ext>
+    </p:extLst>
+  </p:cSld>
+  <p:clrMapOvr>
+    <a:masterClrMapping/>
+  </p:clrMapOvr>
+</p:sld>
+</file>
+
+<file path=ppt/slides/slide16.xml><?xml version="1.0" encoding="utf-8"?>
+<p:sld xmlns:a="http://schemas.openxmlformats.org/drawingml/2006/main" xmlns:r="http://schemas.openxmlformats.org/officeDocument/2006/relationships" xmlns:p="http://schemas.openxmlformats.org/presentationml/2006/main">
+  <p:cSld>
+    <p:spTree>
+      <p:nvGrpSpPr>
+        <p:cNvPr id="1" name=""/>
+        <p:cNvGrpSpPr/>
+        <p:nvPr/>
+      </p:nvGrpSpPr>
+      <p:grpSpPr>
+        <a:xfrm>
+          <a:off x="0" y="0"/>
+          <a:ext cx="0" cy="0"/>
+          <a:chOff x="0" y="0"/>
+          <a:chExt cx="0" cy="0"/>
+        </a:xfrm>
+      </p:grpSpPr>
+      <p:sp>
+        <p:nvSpPr>
           <p:cNvPr id="2" name="ZoneTexte 1"/>
           <p:cNvSpPr txBox="1"/>
           <p:nvPr/>
@@ -4698,7 +4945,7 @@
 </p:sld>
 </file>
 
-<file path=ppt/slides/slide16.xml><?xml version="1.0" encoding="utf-8"?>
+<file path=ppt/slides/slide17.xml><?xml version="1.0" encoding="utf-8"?>
 <p:sld xmlns:a="http://schemas.openxmlformats.org/drawingml/2006/main" xmlns:r="http://schemas.openxmlformats.org/officeDocument/2006/relationships" xmlns:p="http://schemas.openxmlformats.org/presentationml/2006/main">
   <p:cSld>
     <p:spTree>
@@ -5184,7 +5431,7 @@
 </p:sld>
 </file>
 
-<file path=ppt/slides/slide17.xml><?xml version="1.0" encoding="utf-8"?>
+<file path=ppt/slides/slide18.xml><?xml version="1.0" encoding="utf-8"?>
 <p:sld xmlns:a="http://schemas.openxmlformats.org/drawingml/2006/main" xmlns:r="http://schemas.openxmlformats.org/officeDocument/2006/relationships" xmlns:p="http://schemas.openxmlformats.org/presentationml/2006/main">
   <p:cSld>
     <p:spTree>
@@ -5348,7 +5595,7 @@
 </p:sld>
 </file>
 
-<file path=ppt/slides/slide18.xml><?xml version="1.0" encoding="utf-8"?>
+<file path=ppt/slides/slide19.xml><?xml version="1.0" encoding="utf-8"?>
 <p:sld xmlns:a="http://schemas.openxmlformats.org/drawingml/2006/main" xmlns:r="http://schemas.openxmlformats.org/officeDocument/2006/relationships" xmlns:p="http://schemas.openxmlformats.org/presentationml/2006/main">
   <p:cSld>
     <p:spTree>
@@ -5506,7 +5753,172 @@
 </p:sld>
 </file>
 
-<file path=ppt/slides/slide19.xml><?xml version="1.0" encoding="utf-8"?>
+<file path=ppt/slides/slide2.xml><?xml version="1.0" encoding="utf-8"?>
+<p:sld xmlns:a="http://schemas.openxmlformats.org/drawingml/2006/main" xmlns:r="http://schemas.openxmlformats.org/officeDocument/2006/relationships" xmlns:p="http://schemas.openxmlformats.org/presentationml/2006/main">
+  <p:cSld>
+    <p:spTree>
+      <p:nvGrpSpPr>
+        <p:cNvPr id="1" name=""/>
+        <p:cNvGrpSpPr/>
+        <p:nvPr/>
+      </p:nvGrpSpPr>
+      <p:grpSpPr>
+        <a:xfrm>
+          <a:off x="0" y="0"/>
+          <a:ext cx="0" cy="0"/>
+          <a:chOff x="0" y="0"/>
+          <a:chExt cx="0" cy="0"/>
+        </a:xfrm>
+      </p:grpSpPr>
+      <p:sp>
+        <p:nvSpPr>
+          <p:cNvPr id="2" name="ZoneTexte 1"/>
+          <p:cNvSpPr txBox="1"/>
+          <p:nvPr/>
+        </p:nvSpPr>
+        <p:spPr>
+          <a:xfrm>
+            <a:off x="0" y="402955"/>
+            <a:ext cx="9144000" cy="584775"/>
+          </a:xfrm>
+          <a:prstGeom prst="rect">
+            <a:avLst/>
+          </a:prstGeom>
+          <a:noFill/>
+        </p:spPr>
+        <p:txBody>
+          <a:bodyPr wrap="square" rtlCol="0">
+            <a:spAutoFit/>
+          </a:bodyPr>
+          <a:lstStyle/>
+          <a:p>
+            <a:pPr algn="ctr"/>
+            <a:r>
+              <a:rPr lang="fr-FR" sz="3200" dirty="0" smtClean="0"/>
+              <a:t>Via Internet</a:t>
+            </a:r>
+            <a:endParaRPr lang="fr-FR" sz="3200" dirty="0"/>
+          </a:p>
+        </p:txBody>
+      </p:sp>
+      <p:sp>
+        <p:nvSpPr>
+          <p:cNvPr id="3" name="ZoneTexte 2"/>
+          <p:cNvSpPr txBox="1"/>
+          <p:nvPr/>
+        </p:nvSpPr>
+        <p:spPr>
+          <a:xfrm>
+            <a:off x="319297" y="1214651"/>
+            <a:ext cx="8483509" cy="3785652"/>
+          </a:xfrm>
+          <a:prstGeom prst="rect">
+            <a:avLst/>
+          </a:prstGeom>
+          <a:noFill/>
+        </p:spPr>
+        <p:txBody>
+          <a:bodyPr wrap="square" rtlCol="0">
+            <a:spAutoFit/>
+          </a:bodyPr>
+          <a:lstStyle/>
+          <a:p>
+            <a:r>
+              <a:rPr lang="fr-FR" sz="2000" b="1" u="sng" dirty="0" smtClean="0"/>
+              <a:t>Données </a:t>
+            </a:r>
+            <a:r>
+              <a:rPr lang="fr-FR" sz="2000" b="1" u="sng" dirty="0" err="1" smtClean="0"/>
+              <a:t>carto</a:t>
+            </a:r>
+            <a:r>
+              <a:rPr lang="fr-FR" sz="2000" b="1" u="sng" dirty="0" smtClean="0"/>
+              <a:t> France</a:t>
+            </a:r>
+          </a:p>
+          <a:p>
+            <a:endParaRPr lang="fr-FR" sz="2000" b="1" u="sng" dirty="0" smtClean="0"/>
+          </a:p>
+          <a:p>
+            <a:endParaRPr lang="fr-FR" sz="2000" b="1" u="sng" dirty="0"/>
+          </a:p>
+          <a:p>
+            <a:r>
+              <a:rPr lang="fr-FR" sz="2000" b="1" u="sng" dirty="0"/>
+              <a:t>Données </a:t>
+            </a:r>
+            <a:r>
+              <a:rPr lang="fr-FR" sz="2000" b="1" u="sng" dirty="0" err="1"/>
+              <a:t>carto</a:t>
+            </a:r>
+            <a:r>
+              <a:rPr lang="fr-FR" sz="2000" b="1" u="sng" dirty="0"/>
+              <a:t> </a:t>
+            </a:r>
+            <a:r>
+              <a:rPr lang="fr-FR" sz="2000" b="1" u="sng" dirty="0" smtClean="0"/>
+              <a:t>Monde</a:t>
+            </a:r>
+          </a:p>
+          <a:p>
+            <a:endParaRPr lang="fr-FR" sz="2000" b="1" u="sng" dirty="0" smtClean="0"/>
+          </a:p>
+          <a:p>
+            <a:endParaRPr lang="fr-FR" sz="2000" b="1" u="sng" dirty="0" smtClean="0"/>
+          </a:p>
+          <a:p>
+            <a:r>
+              <a:rPr lang="fr-FR" sz="2000" b="1" u="sng" dirty="0" smtClean="0"/>
+              <a:t>Utilisation SAS </a:t>
+            </a:r>
+            <a:r>
+              <a:rPr lang="fr-FR" sz="2000" b="1" u="sng" dirty="0" err="1" smtClean="0"/>
+              <a:t>Planet</a:t>
+            </a:r>
+            <a:endParaRPr lang="fr-FR" sz="2000" b="1" u="sng" dirty="0"/>
+          </a:p>
+          <a:p>
+            <a:endParaRPr lang="fr-FR" sz="2000" b="1" u="sng" dirty="0" smtClean="0"/>
+          </a:p>
+          <a:p>
+            <a:endParaRPr lang="fr-FR" sz="2000" b="1" u="sng" dirty="0"/>
+          </a:p>
+          <a:p>
+            <a:r>
+              <a:rPr lang="fr-FR" sz="2000" b="1" u="sng" dirty="0" smtClean="0"/>
+              <a:t>Serveurs de cartes</a:t>
+            </a:r>
+            <a:endParaRPr lang="fr-FR" sz="2000" b="1" u="sng" dirty="0"/>
+          </a:p>
+          <a:p>
+            <a:endParaRPr lang="fr-FR" sz="2000" dirty="0"/>
+          </a:p>
+          <a:p>
+            <a:endParaRPr lang="fr-FR" sz="2000" dirty="0" smtClean="0"/>
+          </a:p>
+        </p:txBody>
+      </p:sp>
+    </p:spTree>
+    <p:extLst>
+      <p:ext uri="{BB962C8B-B14F-4D97-AF65-F5344CB8AC3E}">
+        <p14:creationId xmlns:p14="http://schemas.microsoft.com/office/powerpoint/2010/main" val="3586088280"/>
+      </p:ext>
+    </p:extLst>
+  </p:cSld>
+  <p:clrMapOvr>
+    <a:masterClrMapping/>
+  </p:clrMapOvr>
+  <p:timing>
+    <p:tnLst>
+      <p:par>
+        <p:cTn id="1" dur="indefinite" restart="never" nodeType="tmRoot"/>
+      </p:par>
+    </p:tnLst>
+  </p:timing>
+</p:sld>
+</file>
+
+<file path=ppt/slides/slide20.xml><?xml version="1.0" encoding="utf-8"?>
 <p:sld xmlns:a="http://schemas.openxmlformats.org/drawingml/2006/main" xmlns:r="http://schemas.openxmlformats.org/officeDocument/2006/relationships" xmlns:p="http://schemas.openxmlformats.org/presentationml/2006/main">
   <p:cSld>
     <p:spTree>
@@ -5657,172 +6069,7 @@
 </p:sld>
 </file>
 
-<file path=ppt/slides/slide2.xml><?xml version="1.0" encoding="utf-8"?>
-<p:sld xmlns:a="http://schemas.openxmlformats.org/drawingml/2006/main" xmlns:r="http://schemas.openxmlformats.org/officeDocument/2006/relationships" xmlns:p="http://schemas.openxmlformats.org/presentationml/2006/main">
-  <p:cSld>
-    <p:spTree>
-      <p:nvGrpSpPr>
-        <p:cNvPr id="1" name=""/>
-        <p:cNvGrpSpPr/>
-        <p:nvPr/>
-      </p:nvGrpSpPr>
-      <p:grpSpPr>
-        <a:xfrm>
-          <a:off x="0" y="0"/>
-          <a:ext cx="0" cy="0"/>
-          <a:chOff x="0" y="0"/>
-          <a:chExt cx="0" cy="0"/>
-        </a:xfrm>
-      </p:grpSpPr>
-      <p:sp>
-        <p:nvSpPr>
-          <p:cNvPr id="2" name="ZoneTexte 1"/>
-          <p:cNvSpPr txBox="1"/>
-          <p:nvPr/>
-        </p:nvSpPr>
-        <p:spPr>
-          <a:xfrm>
-            <a:off x="0" y="402955"/>
-            <a:ext cx="9144000" cy="584775"/>
-          </a:xfrm>
-          <a:prstGeom prst="rect">
-            <a:avLst/>
-          </a:prstGeom>
-          <a:noFill/>
-        </p:spPr>
-        <p:txBody>
-          <a:bodyPr wrap="square" rtlCol="0">
-            <a:spAutoFit/>
-          </a:bodyPr>
-          <a:lstStyle/>
-          <a:p>
-            <a:pPr algn="ctr"/>
-            <a:r>
-              <a:rPr lang="fr-FR" sz="3200" dirty="0" smtClean="0"/>
-              <a:t>Via Internet</a:t>
-            </a:r>
-            <a:endParaRPr lang="fr-FR" sz="3200" dirty="0"/>
-          </a:p>
-        </p:txBody>
-      </p:sp>
-      <p:sp>
-        <p:nvSpPr>
-          <p:cNvPr id="3" name="ZoneTexte 2"/>
-          <p:cNvSpPr txBox="1"/>
-          <p:nvPr/>
-        </p:nvSpPr>
-        <p:spPr>
-          <a:xfrm>
-            <a:off x="319297" y="1214651"/>
-            <a:ext cx="8483509" cy="3785652"/>
-          </a:xfrm>
-          <a:prstGeom prst="rect">
-            <a:avLst/>
-          </a:prstGeom>
-          <a:noFill/>
-        </p:spPr>
-        <p:txBody>
-          <a:bodyPr wrap="square" rtlCol="0">
-            <a:spAutoFit/>
-          </a:bodyPr>
-          <a:lstStyle/>
-          <a:p>
-            <a:r>
-              <a:rPr lang="fr-FR" sz="2000" b="1" u="sng" dirty="0" smtClean="0"/>
-              <a:t>Données </a:t>
-            </a:r>
-            <a:r>
-              <a:rPr lang="fr-FR" sz="2000" b="1" u="sng" dirty="0" err="1" smtClean="0"/>
-              <a:t>carto</a:t>
-            </a:r>
-            <a:r>
-              <a:rPr lang="fr-FR" sz="2000" b="1" u="sng" dirty="0" smtClean="0"/>
-              <a:t> France</a:t>
-            </a:r>
-          </a:p>
-          <a:p>
-            <a:endParaRPr lang="fr-FR" sz="2000" b="1" u="sng" dirty="0" smtClean="0"/>
-          </a:p>
-          <a:p>
-            <a:endParaRPr lang="fr-FR" sz="2000" b="1" u="sng" dirty="0"/>
-          </a:p>
-          <a:p>
-            <a:r>
-              <a:rPr lang="fr-FR" sz="2000" b="1" u="sng" dirty="0"/>
-              <a:t>Données </a:t>
-            </a:r>
-            <a:r>
-              <a:rPr lang="fr-FR" sz="2000" b="1" u="sng" dirty="0" err="1"/>
-              <a:t>carto</a:t>
-            </a:r>
-            <a:r>
-              <a:rPr lang="fr-FR" sz="2000" b="1" u="sng" dirty="0"/>
-              <a:t> </a:t>
-            </a:r>
-            <a:r>
-              <a:rPr lang="fr-FR" sz="2000" b="1" u="sng" dirty="0" smtClean="0"/>
-              <a:t>Monde</a:t>
-            </a:r>
-          </a:p>
-          <a:p>
-            <a:endParaRPr lang="fr-FR" sz="2000" b="1" u="sng" dirty="0" smtClean="0"/>
-          </a:p>
-          <a:p>
-            <a:endParaRPr lang="fr-FR" sz="2000" b="1" u="sng" dirty="0" smtClean="0"/>
-          </a:p>
-          <a:p>
-            <a:r>
-              <a:rPr lang="fr-FR" sz="2000" b="1" u="sng" dirty="0" smtClean="0"/>
-              <a:t>Utilisation SAS </a:t>
-            </a:r>
-            <a:r>
-              <a:rPr lang="fr-FR" sz="2000" b="1" u="sng" dirty="0" err="1" smtClean="0"/>
-              <a:t>Planet</a:t>
-            </a:r>
-            <a:endParaRPr lang="fr-FR" sz="2000" b="1" u="sng" dirty="0"/>
-          </a:p>
-          <a:p>
-            <a:endParaRPr lang="fr-FR" sz="2000" b="1" u="sng" dirty="0" smtClean="0"/>
-          </a:p>
-          <a:p>
-            <a:endParaRPr lang="fr-FR" sz="2000" b="1" u="sng" dirty="0"/>
-          </a:p>
-          <a:p>
-            <a:r>
-              <a:rPr lang="fr-FR" sz="2000" b="1" u="sng" dirty="0" smtClean="0"/>
-              <a:t>Serveurs de cartes</a:t>
-            </a:r>
-            <a:endParaRPr lang="fr-FR" sz="2000" b="1" u="sng" dirty="0"/>
-          </a:p>
-          <a:p>
-            <a:endParaRPr lang="fr-FR" sz="2000" dirty="0"/>
-          </a:p>
-          <a:p>
-            <a:endParaRPr lang="fr-FR" sz="2000" dirty="0" smtClean="0"/>
-          </a:p>
-        </p:txBody>
-      </p:sp>
-    </p:spTree>
-    <p:extLst>
-      <p:ext uri="{BB962C8B-B14F-4D97-AF65-F5344CB8AC3E}">
-        <p14:creationId xmlns:p14="http://schemas.microsoft.com/office/powerpoint/2010/main" val="3586088280"/>
-      </p:ext>
-    </p:extLst>
-  </p:cSld>
-  <p:clrMapOvr>
-    <a:masterClrMapping/>
-  </p:clrMapOvr>
-  <p:timing>
-    <p:tnLst>
-      <p:par>
-        <p:cTn id="1" dur="indefinite" restart="never" nodeType="tmRoot"/>
-      </p:par>
-    </p:tnLst>
-  </p:timing>
-</p:sld>
-</file>
-
-<file path=ppt/slides/slide20.xml><?xml version="1.0" encoding="utf-8"?>
+<file path=ppt/slides/slide21.xml><?xml version="1.0" encoding="utf-8"?>
 <p:sld xmlns:a="http://schemas.openxmlformats.org/drawingml/2006/main" xmlns:r="http://schemas.openxmlformats.org/officeDocument/2006/relationships" xmlns:p="http://schemas.openxmlformats.org/presentationml/2006/main">
   <p:cSld>
     <p:spTree>
@@ -7272,7 +7519,7 @@
 </p:sld>
 </file>
 
-<file path=ppt/slides/slide21.xml><?xml version="1.0" encoding="utf-8"?>
+<file path=ppt/slides/slide22.xml><?xml version="1.0" encoding="utf-8"?>
 <p:sld xmlns:a="http://schemas.openxmlformats.org/drawingml/2006/main" xmlns:r="http://schemas.openxmlformats.org/officeDocument/2006/relationships" xmlns:p="http://schemas.openxmlformats.org/presentationml/2006/main">
   <p:cSld>
     <p:spTree>
@@ -7889,7 +8136,7 @@
 </p:sld>
 </file>
 
-<file path=ppt/slides/slide22.xml><?xml version="1.0" encoding="utf-8"?>
+<file path=ppt/slides/slide23.xml><?xml version="1.0" encoding="utf-8"?>
 <p:sld xmlns:a="http://schemas.openxmlformats.org/drawingml/2006/main" xmlns:r="http://schemas.openxmlformats.org/officeDocument/2006/relationships" xmlns:p="http://schemas.openxmlformats.org/presentationml/2006/main">
   <p:cSld>
     <p:spTree>
@@ -8058,7 +8305,7 @@
 </p:sld>
 </file>
 
-<file path=ppt/slides/slide23.xml><?xml version="1.0" encoding="utf-8"?>
+<file path=ppt/slides/slide24.xml><?xml version="1.0" encoding="utf-8"?>
 <p:sld xmlns:a="http://schemas.openxmlformats.org/drawingml/2006/main" xmlns:r="http://schemas.openxmlformats.org/officeDocument/2006/relationships" xmlns:p="http://schemas.openxmlformats.org/presentationml/2006/main">
   <p:cSld>
     <p:spTree>
@@ -8174,7 +8421,7 @@
 </p:sld>
 </file>
 
-<file path=ppt/slides/slide24.xml><?xml version="1.0" encoding="utf-8"?>
+<file path=ppt/slides/slide25.xml><?xml version="1.0" encoding="utf-8"?>
 <p:sld xmlns:a="http://schemas.openxmlformats.org/drawingml/2006/main" xmlns:r="http://schemas.openxmlformats.org/officeDocument/2006/relationships" xmlns:p="http://schemas.openxmlformats.org/presentationml/2006/main">
   <p:cSld>
     <p:spTree>
@@ -8749,7 +8996,7 @@
 </p:sld>
 </file>
 
-<file path=ppt/slides/slide25.xml><?xml version="1.0" encoding="utf-8"?>
+<file path=ppt/slides/slide26.xml><?xml version="1.0" encoding="utf-8"?>
 <p:sld xmlns:a="http://schemas.openxmlformats.org/drawingml/2006/main" xmlns:r="http://schemas.openxmlformats.org/officeDocument/2006/relationships" xmlns:p="http://schemas.openxmlformats.org/presentationml/2006/main">
   <p:cSld>
     <p:spTree>
@@ -9363,326 +9610,6 @@
     <p:extLst>
       <p:ext uri="{BB962C8B-B14F-4D97-AF65-F5344CB8AC3E}">
         <p14:creationId xmlns:p14="http://schemas.microsoft.com/office/powerpoint/2010/main" val="2593450732"/>
-      </p:ext>
-    </p:extLst>
-  </p:cSld>
-  <p:clrMapOvr>
-    <a:masterClrMapping/>
-  </p:clrMapOvr>
-  <p:transition spd="slow"/>
-</p:sld>
-</file>
-
-<file path=ppt/slides/slide26.xml><?xml version="1.0" encoding="utf-8"?>
-<p:sld xmlns:a="http://schemas.openxmlformats.org/drawingml/2006/main" xmlns:r="http://schemas.openxmlformats.org/officeDocument/2006/relationships" xmlns:p="http://schemas.openxmlformats.org/presentationml/2006/main">
-  <p:cSld>
-    <p:spTree>
-      <p:nvGrpSpPr>
-        <p:cNvPr id="1" name=""/>
-        <p:cNvGrpSpPr/>
-        <p:nvPr/>
-      </p:nvGrpSpPr>
-      <p:grpSpPr>
-        <a:xfrm>
-          <a:off x="0" y="0"/>
-          <a:ext cx="0" cy="0"/>
-          <a:chOff x="0" y="0"/>
-          <a:chExt cx="0" cy="0"/>
-        </a:xfrm>
-      </p:grpSpPr>
-      <p:pic>
-        <p:nvPicPr>
-          <p:cNvPr id="5" name="Image 4"/>
-          <p:cNvPicPr>
-            <a:picLocks noChangeAspect="1"/>
-          </p:cNvPicPr>
-          <p:nvPr/>
-        </p:nvPicPr>
-        <p:blipFill rotWithShape="1">
-          <a:blip r:embed="rId3" cstate="email">
-            <a:extLst>
-              <a:ext uri="{28A0092B-C50C-407E-A947-70E740481C1C}">
-                <a14:useLocalDpi xmlns:a14="http://schemas.microsoft.com/office/drawing/2010/main"/>
-              </a:ext>
-            </a:extLst>
-          </a:blip>
-          <a:srcRect/>
-          <a:stretch/>
-        </p:blipFill>
-        <p:spPr>
-          <a:xfrm>
-            <a:off x="1143000" y="857251"/>
-            <a:ext cx="6858000" cy="1492529"/>
-          </a:xfrm>
-          <a:prstGeom prst="rect">
-            <a:avLst/>
-          </a:prstGeom>
-        </p:spPr>
-      </p:pic>
-      <p:sp>
-        <p:nvSpPr>
-          <p:cNvPr id="6" name="Ellipse 5"/>
-          <p:cNvSpPr/>
-          <p:nvPr/>
-        </p:nvSpPr>
-        <p:spPr>
-          <a:xfrm>
-            <a:off x="6678115" y="2078851"/>
-            <a:ext cx="918221" cy="270929"/>
-          </a:xfrm>
-          <a:prstGeom prst="ellipse">
-            <a:avLst/>
-          </a:prstGeom>
-          <a:noFill/>
-          <a:ln>
-            <a:solidFill>
-              <a:srgbClr val="FF0000"/>
-            </a:solidFill>
-          </a:ln>
-        </p:spPr>
-        <p:style>
-          <a:lnRef idx="2">
-            <a:schemeClr val="accent1">
-              <a:shade val="50000"/>
-            </a:schemeClr>
-          </a:lnRef>
-          <a:fillRef idx="1">
-            <a:schemeClr val="accent1"/>
-          </a:fillRef>
-          <a:effectRef idx="0">
-            <a:schemeClr val="accent1"/>
-          </a:effectRef>
-          <a:fontRef idx="minor">
-            <a:schemeClr val="lt1"/>
-          </a:fontRef>
-        </p:style>
-        <p:txBody>
-          <a:bodyPr rtlCol="0" anchor="ctr"/>
-          <a:lstStyle/>
-          <a:p>
-            <a:pPr algn="ctr"/>
-            <a:endParaRPr lang="fr-FR" sz="1350"/>
-          </a:p>
-        </p:txBody>
-      </p:sp>
-      <p:sp>
-        <p:nvSpPr>
-          <p:cNvPr id="3" name="Rectangle 18"/>
-          <p:cNvSpPr txBox="1">
-            <a:spLocks noChangeArrowheads="1"/>
-          </p:cNvSpPr>
-          <p:nvPr/>
-        </p:nvSpPr>
-        <p:spPr>
-          <a:xfrm>
-            <a:off x="2951820" y="2450511"/>
-            <a:ext cx="3240360" cy="432048"/>
-          </a:xfrm>
-          <a:prstGeom prst="rect">
-            <a:avLst/>
-          </a:prstGeom>
-          <a:solidFill>
-            <a:schemeClr val="bg1"/>
-          </a:solidFill>
-          <a:ln>
-            <a:solidFill>
-              <a:schemeClr val="tx1"/>
-            </a:solidFill>
-          </a:ln>
-        </p:spPr>
-        <p:txBody>
-          <a:bodyPr/>
-          <a:lstStyle>
-            <a:lvl1pPr algn="l" rtl="0" eaLnBrk="0" fontAlgn="base" hangingPunct="0">
-              <a:spcBef>
-                <a:spcPct val="0"/>
-              </a:spcBef>
-              <a:spcAft>
-                <a:spcPct val="0"/>
-              </a:spcAft>
-              <a:defRPr sz="3600" kern="1200" cap="all">
-                <a:solidFill>
-                  <a:schemeClr val="tx2"/>
-                </a:solidFill>
-                <a:effectLst>
-                  <a:reflection blurRad="12700" stA="48000" endA="300" endPos="55000" dir="5400000" sy="-90000" algn="bl" rotWithShape="0"/>
-                </a:effectLst>
-                <a:latin typeface="+mj-lt"/>
-                <a:ea typeface="+mj-ea"/>
-                <a:cs typeface="+mj-cs"/>
-              </a:defRPr>
-            </a:lvl1pPr>
-            <a:lvl2pPr algn="l" rtl="0" eaLnBrk="0" fontAlgn="base" hangingPunct="0">
-              <a:spcBef>
-                <a:spcPct val="0"/>
-              </a:spcBef>
-              <a:spcAft>
-                <a:spcPct val="0"/>
-              </a:spcAft>
-              <a:defRPr sz="3600">
-                <a:solidFill>
-                  <a:schemeClr val="tx2"/>
-                </a:solidFill>
-                <a:latin typeface="Franklin Gothic Medium" pitchFamily="34" charset="0"/>
-              </a:defRPr>
-            </a:lvl2pPr>
-            <a:lvl3pPr algn="l" rtl="0" eaLnBrk="0" fontAlgn="base" hangingPunct="0">
-              <a:spcBef>
-                <a:spcPct val="0"/>
-              </a:spcBef>
-              <a:spcAft>
-                <a:spcPct val="0"/>
-              </a:spcAft>
-              <a:defRPr sz="3600">
-                <a:solidFill>
-                  <a:schemeClr val="tx2"/>
-                </a:solidFill>
-                <a:latin typeface="Franklin Gothic Medium" pitchFamily="34" charset="0"/>
-              </a:defRPr>
-            </a:lvl3pPr>
-            <a:lvl4pPr algn="l" rtl="0" eaLnBrk="0" fontAlgn="base" hangingPunct="0">
-              <a:spcBef>
-                <a:spcPct val="0"/>
-              </a:spcBef>
-              <a:spcAft>
-                <a:spcPct val="0"/>
-              </a:spcAft>
-              <a:defRPr sz="3600">
-                <a:solidFill>
-                  <a:schemeClr val="tx2"/>
-                </a:solidFill>
-                <a:latin typeface="Franklin Gothic Medium" pitchFamily="34" charset="0"/>
-              </a:defRPr>
-            </a:lvl4pPr>
-            <a:lvl5pPr algn="l" rtl="0" eaLnBrk="0" fontAlgn="base" hangingPunct="0">
-              <a:spcBef>
-                <a:spcPct val="0"/>
-              </a:spcBef>
-              <a:spcAft>
-                <a:spcPct val="0"/>
-              </a:spcAft>
-              <a:defRPr sz="3600">
-                <a:solidFill>
-                  <a:schemeClr val="tx2"/>
-                </a:solidFill>
-                <a:latin typeface="Franklin Gothic Medium" pitchFamily="34" charset="0"/>
-              </a:defRPr>
-            </a:lvl5pPr>
-            <a:lvl6pPr marL="457200" algn="l" rtl="0" fontAlgn="base">
-              <a:spcBef>
-                <a:spcPct val="0"/>
-              </a:spcBef>
-              <a:spcAft>
-                <a:spcPct val="0"/>
-              </a:spcAft>
-              <a:defRPr sz="3600">
-                <a:solidFill>
-                  <a:schemeClr val="tx2"/>
-                </a:solidFill>
-                <a:latin typeface="Franklin Gothic Medium" pitchFamily="34" charset="0"/>
-              </a:defRPr>
-            </a:lvl6pPr>
-            <a:lvl7pPr marL="914400" algn="l" rtl="0" fontAlgn="base">
-              <a:spcBef>
-                <a:spcPct val="0"/>
-              </a:spcBef>
-              <a:spcAft>
-                <a:spcPct val="0"/>
-              </a:spcAft>
-              <a:defRPr sz="3600">
-                <a:solidFill>
-                  <a:schemeClr val="tx2"/>
-                </a:solidFill>
-                <a:latin typeface="Franklin Gothic Medium" pitchFamily="34" charset="0"/>
-              </a:defRPr>
-            </a:lvl7pPr>
-            <a:lvl8pPr marL="1371600" algn="l" rtl="0" fontAlgn="base">
-              <a:spcBef>
-                <a:spcPct val="0"/>
-              </a:spcBef>
-              <a:spcAft>
-                <a:spcPct val="0"/>
-              </a:spcAft>
-              <a:defRPr sz="3600">
-                <a:solidFill>
-                  <a:schemeClr val="tx2"/>
-                </a:solidFill>
-                <a:latin typeface="Franklin Gothic Medium" pitchFamily="34" charset="0"/>
-              </a:defRPr>
-            </a:lvl8pPr>
-            <a:lvl9pPr marL="1828800" algn="l" rtl="0" fontAlgn="base">
-              <a:spcBef>
-                <a:spcPct val="0"/>
-              </a:spcBef>
-              <a:spcAft>
-                <a:spcPct val="0"/>
-              </a:spcAft>
-              <a:defRPr sz="3600">
-                <a:solidFill>
-                  <a:schemeClr val="tx2"/>
-                </a:solidFill>
-                <a:latin typeface="Franklin Gothic Medium" pitchFamily="34" charset="0"/>
-              </a:defRPr>
-            </a:lvl9pPr>
-          </a:lstStyle>
-          <a:p>
-            <a:pPr algn="ctr" eaLnBrk="1" hangingPunct="1">
-              <a:defRPr/>
-            </a:pPr>
-            <a:r>
-              <a:rPr lang="fr-FR" sz="1800" b="1" i="1" u="sng" dirty="0">
-                <a:solidFill>
-                  <a:schemeClr val="accent6">
-                    <a:lumMod val="50000"/>
-                  </a:schemeClr>
-                </a:solidFill>
-                <a:latin typeface="Arial" panose="020B0604020202020204" pitchFamily="34" charset="0"/>
-                <a:cs typeface="Arial" panose="020B0604020202020204" pitchFamily="34" charset="0"/>
-              </a:rPr>
-              <a:t>CARTES SENTINELLE</a:t>
-            </a:r>
-          </a:p>
-        </p:txBody>
-      </p:sp>
-      <p:pic>
-        <p:nvPicPr>
-          <p:cNvPr id="2" name="Image 1"/>
-          <p:cNvPicPr>
-            <a:picLocks noChangeAspect="1"/>
-          </p:cNvPicPr>
-          <p:nvPr/>
-        </p:nvPicPr>
-        <p:blipFill>
-          <a:blip r:embed="rId4" cstate="email">
-            <a:extLst>
-              <a:ext uri="{28A0092B-C50C-407E-A947-70E740481C1C}">
-                <a14:useLocalDpi xmlns:a14="http://schemas.microsoft.com/office/drawing/2010/main"/>
-              </a:ext>
-            </a:extLst>
-          </a:blip>
-          <a:stretch>
-            <a:fillRect/>
-          </a:stretch>
-        </p:blipFill>
-        <p:spPr>
-          <a:xfrm>
-            <a:off x="2453989" y="2996952"/>
-            <a:ext cx="4236023" cy="2997000"/>
-          </a:xfrm>
-          <a:prstGeom prst="rect">
-            <a:avLst/>
-          </a:prstGeom>
-          <a:ln>
-            <a:solidFill>
-              <a:schemeClr val="tx1"/>
-            </a:solidFill>
-          </a:ln>
-        </p:spPr>
-      </p:pic>
-    </p:spTree>
-    <p:extLst>
-      <p:ext uri="{BB962C8B-B14F-4D97-AF65-F5344CB8AC3E}">
-        <p14:creationId xmlns:p14="http://schemas.microsoft.com/office/powerpoint/2010/main" val="1483593224"/>
       </p:ext>
     </p:extLst>
   </p:cSld>
@@ -9747,6 +9674,326 @@
         </p:nvSpPr>
         <p:spPr>
           <a:xfrm>
+            <a:off x="6678115" y="2078851"/>
+            <a:ext cx="918221" cy="270929"/>
+          </a:xfrm>
+          <a:prstGeom prst="ellipse">
+            <a:avLst/>
+          </a:prstGeom>
+          <a:noFill/>
+          <a:ln>
+            <a:solidFill>
+              <a:srgbClr val="FF0000"/>
+            </a:solidFill>
+          </a:ln>
+        </p:spPr>
+        <p:style>
+          <a:lnRef idx="2">
+            <a:schemeClr val="accent1">
+              <a:shade val="50000"/>
+            </a:schemeClr>
+          </a:lnRef>
+          <a:fillRef idx="1">
+            <a:schemeClr val="accent1"/>
+          </a:fillRef>
+          <a:effectRef idx="0">
+            <a:schemeClr val="accent1"/>
+          </a:effectRef>
+          <a:fontRef idx="minor">
+            <a:schemeClr val="lt1"/>
+          </a:fontRef>
+        </p:style>
+        <p:txBody>
+          <a:bodyPr rtlCol="0" anchor="ctr"/>
+          <a:lstStyle/>
+          <a:p>
+            <a:pPr algn="ctr"/>
+            <a:endParaRPr lang="fr-FR" sz="1350"/>
+          </a:p>
+        </p:txBody>
+      </p:sp>
+      <p:sp>
+        <p:nvSpPr>
+          <p:cNvPr id="3" name="Rectangle 18"/>
+          <p:cNvSpPr txBox="1">
+            <a:spLocks noChangeArrowheads="1"/>
+          </p:cNvSpPr>
+          <p:nvPr/>
+        </p:nvSpPr>
+        <p:spPr>
+          <a:xfrm>
+            <a:off x="2951820" y="2450511"/>
+            <a:ext cx="3240360" cy="432048"/>
+          </a:xfrm>
+          <a:prstGeom prst="rect">
+            <a:avLst/>
+          </a:prstGeom>
+          <a:solidFill>
+            <a:schemeClr val="bg1"/>
+          </a:solidFill>
+          <a:ln>
+            <a:solidFill>
+              <a:schemeClr val="tx1"/>
+            </a:solidFill>
+          </a:ln>
+        </p:spPr>
+        <p:txBody>
+          <a:bodyPr/>
+          <a:lstStyle>
+            <a:lvl1pPr algn="l" rtl="0" eaLnBrk="0" fontAlgn="base" hangingPunct="0">
+              <a:spcBef>
+                <a:spcPct val="0"/>
+              </a:spcBef>
+              <a:spcAft>
+                <a:spcPct val="0"/>
+              </a:spcAft>
+              <a:defRPr sz="3600" kern="1200" cap="all">
+                <a:solidFill>
+                  <a:schemeClr val="tx2"/>
+                </a:solidFill>
+                <a:effectLst>
+                  <a:reflection blurRad="12700" stA="48000" endA="300" endPos="55000" dir="5400000" sy="-90000" algn="bl" rotWithShape="0"/>
+                </a:effectLst>
+                <a:latin typeface="+mj-lt"/>
+                <a:ea typeface="+mj-ea"/>
+                <a:cs typeface="+mj-cs"/>
+              </a:defRPr>
+            </a:lvl1pPr>
+            <a:lvl2pPr algn="l" rtl="0" eaLnBrk="0" fontAlgn="base" hangingPunct="0">
+              <a:spcBef>
+                <a:spcPct val="0"/>
+              </a:spcBef>
+              <a:spcAft>
+                <a:spcPct val="0"/>
+              </a:spcAft>
+              <a:defRPr sz="3600">
+                <a:solidFill>
+                  <a:schemeClr val="tx2"/>
+                </a:solidFill>
+                <a:latin typeface="Franklin Gothic Medium" pitchFamily="34" charset="0"/>
+              </a:defRPr>
+            </a:lvl2pPr>
+            <a:lvl3pPr algn="l" rtl="0" eaLnBrk="0" fontAlgn="base" hangingPunct="0">
+              <a:spcBef>
+                <a:spcPct val="0"/>
+              </a:spcBef>
+              <a:spcAft>
+                <a:spcPct val="0"/>
+              </a:spcAft>
+              <a:defRPr sz="3600">
+                <a:solidFill>
+                  <a:schemeClr val="tx2"/>
+                </a:solidFill>
+                <a:latin typeface="Franklin Gothic Medium" pitchFamily="34" charset="0"/>
+              </a:defRPr>
+            </a:lvl3pPr>
+            <a:lvl4pPr algn="l" rtl="0" eaLnBrk="0" fontAlgn="base" hangingPunct="0">
+              <a:spcBef>
+                <a:spcPct val="0"/>
+              </a:spcBef>
+              <a:spcAft>
+                <a:spcPct val="0"/>
+              </a:spcAft>
+              <a:defRPr sz="3600">
+                <a:solidFill>
+                  <a:schemeClr val="tx2"/>
+                </a:solidFill>
+                <a:latin typeface="Franklin Gothic Medium" pitchFamily="34" charset="0"/>
+              </a:defRPr>
+            </a:lvl4pPr>
+            <a:lvl5pPr algn="l" rtl="0" eaLnBrk="0" fontAlgn="base" hangingPunct="0">
+              <a:spcBef>
+                <a:spcPct val="0"/>
+              </a:spcBef>
+              <a:spcAft>
+                <a:spcPct val="0"/>
+              </a:spcAft>
+              <a:defRPr sz="3600">
+                <a:solidFill>
+                  <a:schemeClr val="tx2"/>
+                </a:solidFill>
+                <a:latin typeface="Franklin Gothic Medium" pitchFamily="34" charset="0"/>
+              </a:defRPr>
+            </a:lvl5pPr>
+            <a:lvl6pPr marL="457200" algn="l" rtl="0" fontAlgn="base">
+              <a:spcBef>
+                <a:spcPct val="0"/>
+              </a:spcBef>
+              <a:spcAft>
+                <a:spcPct val="0"/>
+              </a:spcAft>
+              <a:defRPr sz="3600">
+                <a:solidFill>
+                  <a:schemeClr val="tx2"/>
+                </a:solidFill>
+                <a:latin typeface="Franklin Gothic Medium" pitchFamily="34" charset="0"/>
+              </a:defRPr>
+            </a:lvl6pPr>
+            <a:lvl7pPr marL="914400" algn="l" rtl="0" fontAlgn="base">
+              <a:spcBef>
+                <a:spcPct val="0"/>
+              </a:spcBef>
+              <a:spcAft>
+                <a:spcPct val="0"/>
+              </a:spcAft>
+              <a:defRPr sz="3600">
+                <a:solidFill>
+                  <a:schemeClr val="tx2"/>
+                </a:solidFill>
+                <a:latin typeface="Franklin Gothic Medium" pitchFamily="34" charset="0"/>
+              </a:defRPr>
+            </a:lvl7pPr>
+            <a:lvl8pPr marL="1371600" algn="l" rtl="0" fontAlgn="base">
+              <a:spcBef>
+                <a:spcPct val="0"/>
+              </a:spcBef>
+              <a:spcAft>
+                <a:spcPct val="0"/>
+              </a:spcAft>
+              <a:defRPr sz="3600">
+                <a:solidFill>
+                  <a:schemeClr val="tx2"/>
+                </a:solidFill>
+                <a:latin typeface="Franklin Gothic Medium" pitchFamily="34" charset="0"/>
+              </a:defRPr>
+            </a:lvl8pPr>
+            <a:lvl9pPr marL="1828800" algn="l" rtl="0" fontAlgn="base">
+              <a:spcBef>
+                <a:spcPct val="0"/>
+              </a:spcBef>
+              <a:spcAft>
+                <a:spcPct val="0"/>
+              </a:spcAft>
+              <a:defRPr sz="3600">
+                <a:solidFill>
+                  <a:schemeClr val="tx2"/>
+                </a:solidFill>
+                <a:latin typeface="Franklin Gothic Medium" pitchFamily="34" charset="0"/>
+              </a:defRPr>
+            </a:lvl9pPr>
+          </a:lstStyle>
+          <a:p>
+            <a:pPr algn="ctr" eaLnBrk="1" hangingPunct="1">
+              <a:defRPr/>
+            </a:pPr>
+            <a:r>
+              <a:rPr lang="fr-FR" sz="1800" b="1" i="1" u="sng" dirty="0">
+                <a:solidFill>
+                  <a:schemeClr val="accent6">
+                    <a:lumMod val="50000"/>
+                  </a:schemeClr>
+                </a:solidFill>
+                <a:latin typeface="Arial" panose="020B0604020202020204" pitchFamily="34" charset="0"/>
+                <a:cs typeface="Arial" panose="020B0604020202020204" pitchFamily="34" charset="0"/>
+              </a:rPr>
+              <a:t>CARTES SENTINELLE</a:t>
+            </a:r>
+          </a:p>
+        </p:txBody>
+      </p:sp>
+      <p:pic>
+        <p:nvPicPr>
+          <p:cNvPr id="2" name="Image 1"/>
+          <p:cNvPicPr>
+            <a:picLocks noChangeAspect="1"/>
+          </p:cNvPicPr>
+          <p:nvPr/>
+        </p:nvPicPr>
+        <p:blipFill>
+          <a:blip r:embed="rId4" cstate="email">
+            <a:extLst>
+              <a:ext uri="{28A0092B-C50C-407E-A947-70E740481C1C}">
+                <a14:useLocalDpi xmlns:a14="http://schemas.microsoft.com/office/drawing/2010/main"/>
+              </a:ext>
+            </a:extLst>
+          </a:blip>
+          <a:stretch>
+            <a:fillRect/>
+          </a:stretch>
+        </p:blipFill>
+        <p:spPr>
+          <a:xfrm>
+            <a:off x="2453989" y="2996952"/>
+            <a:ext cx="4236023" cy="2997000"/>
+          </a:xfrm>
+          <a:prstGeom prst="rect">
+            <a:avLst/>
+          </a:prstGeom>
+          <a:ln>
+            <a:solidFill>
+              <a:schemeClr val="tx1"/>
+            </a:solidFill>
+          </a:ln>
+        </p:spPr>
+      </p:pic>
+    </p:spTree>
+    <p:extLst>
+      <p:ext uri="{BB962C8B-B14F-4D97-AF65-F5344CB8AC3E}">
+        <p14:creationId xmlns:p14="http://schemas.microsoft.com/office/powerpoint/2010/main" val="1483593224"/>
+      </p:ext>
+    </p:extLst>
+  </p:cSld>
+  <p:clrMapOvr>
+    <a:masterClrMapping/>
+  </p:clrMapOvr>
+  <p:transition spd="slow"/>
+</p:sld>
+</file>
+
+<file path=ppt/slides/slide28.xml><?xml version="1.0" encoding="utf-8"?>
+<p:sld xmlns:a="http://schemas.openxmlformats.org/drawingml/2006/main" xmlns:r="http://schemas.openxmlformats.org/officeDocument/2006/relationships" xmlns:p="http://schemas.openxmlformats.org/presentationml/2006/main">
+  <p:cSld>
+    <p:spTree>
+      <p:nvGrpSpPr>
+        <p:cNvPr id="1" name=""/>
+        <p:cNvGrpSpPr/>
+        <p:nvPr/>
+      </p:nvGrpSpPr>
+      <p:grpSpPr>
+        <a:xfrm>
+          <a:off x="0" y="0"/>
+          <a:ext cx="0" cy="0"/>
+          <a:chOff x="0" y="0"/>
+          <a:chExt cx="0" cy="0"/>
+        </a:xfrm>
+      </p:grpSpPr>
+      <p:pic>
+        <p:nvPicPr>
+          <p:cNvPr id="5" name="Image 4"/>
+          <p:cNvPicPr>
+            <a:picLocks noChangeAspect="1"/>
+          </p:cNvPicPr>
+          <p:nvPr/>
+        </p:nvPicPr>
+        <p:blipFill rotWithShape="1">
+          <a:blip r:embed="rId3" cstate="email">
+            <a:extLst>
+              <a:ext uri="{28A0092B-C50C-407E-A947-70E740481C1C}">
+                <a14:useLocalDpi xmlns:a14="http://schemas.microsoft.com/office/drawing/2010/main"/>
+              </a:ext>
+            </a:extLst>
+          </a:blip>
+          <a:srcRect/>
+          <a:stretch/>
+        </p:blipFill>
+        <p:spPr>
+          <a:xfrm>
+            <a:off x="1143000" y="857251"/>
+            <a:ext cx="6858000" cy="1492529"/>
+          </a:xfrm>
+          <a:prstGeom prst="rect">
+            <a:avLst/>
+          </a:prstGeom>
+        </p:spPr>
+      </p:pic>
+      <p:sp>
+        <p:nvSpPr>
+          <p:cNvPr id="6" name="Ellipse 5"/>
+          <p:cNvSpPr/>
+          <p:nvPr/>
+        </p:nvSpPr>
+        <p:spPr>
+          <a:xfrm>
             <a:off x="1287745" y="2078851"/>
             <a:ext cx="864215" cy="270929"/>
           </a:xfrm>
@@ -10022,7 +10269,7 @@
 </p:sld>
 </file>
 
-<file path=ppt/slides/slide28.xml><?xml version="1.0" encoding="utf-8"?>
+<file path=ppt/slides/slide29.xml><?xml version="1.0" encoding="utf-8"?>
 <p:sld xmlns:a="http://schemas.openxmlformats.org/drawingml/2006/main" xmlns:r="http://schemas.openxmlformats.org/officeDocument/2006/relationships" xmlns:p="http://schemas.openxmlformats.org/presentationml/2006/main">
   <p:cSld>
     <p:spTree>
@@ -11032,7 +11279,7 @@
       </p:grpSpPr>
       <p:sp>
         <p:nvSpPr>
-          <p:cNvPr id="3" name="ZoneTexte 2"/>
+          <p:cNvPr id="2" name="ZoneTexte 1"/>
           <p:cNvSpPr txBox="1"/>
           <p:nvPr/>
         </p:nvSpPr>
@@ -11055,11 +11302,7 @@
             <a:pPr algn="ctr"/>
             <a:r>
               <a:rPr lang="fr-FR" sz="3200" dirty="0" smtClean="0"/>
-              <a:t>Exporter depuis SAS </a:t>
-            </a:r>
-            <a:r>
-              <a:rPr lang="fr-FR" sz="3200" dirty="0" err="1" smtClean="0"/>
-              <a:t>Planet</a:t>
+              <a:t>OSM</a:t>
             </a:r>
             <a:endParaRPr lang="fr-FR" sz="3200" dirty="0"/>
           </a:p>
@@ -11067,14 +11310,14 @@
       </p:sp>
       <p:sp>
         <p:nvSpPr>
-          <p:cNvPr id="4" name="ZoneTexte 3"/>
+          <p:cNvPr id="3" name="ZoneTexte 2"/>
           <p:cNvSpPr txBox="1"/>
           <p:nvPr/>
         </p:nvSpPr>
         <p:spPr>
           <a:xfrm>
-            <a:off x="704916" y="1425326"/>
-            <a:ext cx="7959400" cy="1754326"/>
+            <a:off x="319296" y="1214651"/>
+            <a:ext cx="8663339" cy="4955203"/>
           </a:xfrm>
           <a:prstGeom prst="rect">
             <a:avLst/>
@@ -11088,91 +11331,170 @@
           <a:lstStyle/>
           <a:p>
             <a:r>
+              <a:rPr lang="fr-FR" sz="2000" b="1" u="sng" dirty="0" smtClean="0"/>
+              <a:t>Exploiter des données OSM</a:t>
+            </a:r>
+          </a:p>
+          <a:p>
+            <a:endParaRPr lang="fr-FR" sz="2000" dirty="0"/>
+          </a:p>
+          <a:p>
+            <a:r>
+              <a:rPr lang="fr-FR" sz="2000" dirty="0" smtClean="0"/>
+              <a:t>Les données OSM sont souvent fournies avec l’extension .bz2 (compressée)</a:t>
+            </a:r>
+          </a:p>
+          <a:p>
+            <a:r>
+              <a:rPr lang="fr-FR" sz="2000" dirty="0" smtClean="0"/>
+              <a:t>Les fichiers .</a:t>
+            </a:r>
+            <a:r>
+              <a:rPr lang="fr-FR" sz="2000" dirty="0" err="1" smtClean="0"/>
+              <a:t>osm</a:t>
+            </a:r>
+            <a:r>
+              <a:rPr lang="fr-FR" sz="2000" dirty="0" smtClean="0"/>
+              <a:t> sont de fichiers XML directement importable.</a:t>
+            </a:r>
+          </a:p>
+          <a:p>
+            <a:endParaRPr lang="fr-FR" sz="2000" dirty="0"/>
+          </a:p>
+          <a:p>
+            <a:endParaRPr lang="fr-FR" sz="2000" dirty="0" smtClean="0"/>
+          </a:p>
+          <a:p>
+            <a:r>
+              <a:rPr lang="fr-FR" sz="2000" dirty="0" smtClean="0"/>
+              <a:t>Les données apparaissent toutes dans une couche.</a:t>
+            </a:r>
+          </a:p>
+          <a:p>
+            <a:r>
+              <a:rPr lang="fr-FR" sz="2000" dirty="0" smtClean="0"/>
+              <a:t>Pour y voir plus clair, il faut diviser la couche par thématique.</a:t>
+            </a:r>
+          </a:p>
+          <a:p>
+            <a:endParaRPr lang="fr-FR" sz="2000" dirty="0"/>
+          </a:p>
+          <a:p>
+            <a:r>
+              <a:rPr lang="fr-FR" sz="2000" dirty="0" smtClean="0"/>
+              <a:t>Sur la couche OSM, clic droit -&gt; LAYER -&gt; SPLIT</a:t>
+            </a:r>
+          </a:p>
+          <a:p>
+            <a:pPr marL="342900" indent="-342900">
+              <a:buFontTx/>
+              <a:buChar char="-"/>
+            </a:pPr>
+            <a:r>
+              <a:rPr lang="fr-FR" sz="2000" dirty="0" smtClean="0"/>
+              <a:t>Découpage classique : choisir « </a:t>
+            </a:r>
+            <a:r>
+              <a:rPr lang="fr-FR" sz="2000" dirty="0" err="1" smtClean="0"/>
+              <a:t>Feature</a:t>
+            </a:r>
+            <a:r>
+              <a:rPr lang="fr-FR" sz="2000" dirty="0" smtClean="0"/>
+              <a:t> Type »</a:t>
+            </a:r>
+          </a:p>
+          <a:p>
+            <a:pPr marL="342900" indent="-342900">
+              <a:buFontTx/>
+              <a:buChar char="-"/>
+            </a:pPr>
+            <a:r>
+              <a:rPr lang="fr-FR" sz="2000" dirty="0" smtClean="0"/>
+              <a:t>Découpage détaillé </a:t>
+            </a:r>
+            <a:r>
+              <a:rPr lang="fr-FR" sz="2000" dirty="0"/>
+              <a:t>: choisir « </a:t>
+            </a:r>
+            <a:r>
+              <a:rPr lang="fr-FR" sz="2000" dirty="0" err="1"/>
+              <a:t>Feature</a:t>
+            </a:r>
+            <a:r>
+              <a:rPr lang="fr-FR" sz="2000" dirty="0"/>
+              <a:t> </a:t>
+            </a:r>
+            <a:r>
+              <a:rPr lang="fr-FR" sz="2000" dirty="0" smtClean="0"/>
+              <a:t>Description</a:t>
+            </a:r>
+            <a:r>
+              <a:rPr lang="fr-FR" sz="2000" dirty="0"/>
+              <a:t> »</a:t>
+            </a:r>
+          </a:p>
+          <a:p>
+            <a:endParaRPr lang="fr-FR" sz="2000" dirty="0" smtClean="0"/>
+          </a:p>
+          <a:p>
+            <a:r>
+              <a:rPr lang="fr-FR" sz="2000" dirty="0" smtClean="0"/>
+              <a:t>La couche OSM est subdivisée en plusieurs couches (building, </a:t>
+            </a:r>
+            <a:r>
+              <a:rPr lang="fr-FR" sz="2000" dirty="0" err="1" smtClean="0"/>
+              <a:t>highway</a:t>
+            </a:r>
+            <a:r>
+              <a:rPr lang="fr-FR" sz="2000" dirty="0" smtClean="0"/>
+              <a:t>, shopping)</a:t>
+            </a:r>
+          </a:p>
+          <a:p>
+            <a:r>
               <a:rPr lang="fr-FR" dirty="0" smtClean="0"/>
-              <a:t>SAS </a:t>
+              <a:t>De nombreux point non classés se retrouvent dans une couche « </a:t>
             </a:r>
             <a:r>
               <a:rPr lang="fr-FR" dirty="0" err="1" smtClean="0"/>
-              <a:t>Planet</a:t>
+              <a:t>Unknown</a:t>
             </a:r>
             <a:r>
               <a:rPr lang="fr-FR" dirty="0" smtClean="0"/>
-              <a:t> est un logiciel extrêmement pratique : il permet d’afficher de nombreuses sources de </a:t>
+              <a:t> Point </a:t>
             </a:r>
             <a:r>
               <a:rPr lang="fr-FR" dirty="0" err="1" smtClean="0"/>
-              <a:t>carto</a:t>
+              <a:t>Feature</a:t>
             </a:r>
             <a:r>
               <a:rPr lang="fr-FR" dirty="0" smtClean="0"/>
-              <a:t> et de les exporter facilement</a:t>
-            </a:r>
-          </a:p>
-          <a:p>
+              <a:t> »</a:t>
+            </a:r>
             <a:endParaRPr lang="fr-FR" dirty="0" smtClean="0"/>
-          </a:p>
-          <a:p>
-            <a:endParaRPr lang="fr-FR" dirty="0"/>
-          </a:p>
-          <a:p>
-            <a:r>
-              <a:rPr lang="fr-FR" dirty="0" smtClean="0"/>
-              <a:t>Passer SAS </a:t>
-            </a:r>
-            <a:r>
-              <a:rPr lang="fr-FR" dirty="0" err="1" smtClean="0"/>
-              <a:t>Planet</a:t>
-            </a:r>
-            <a:r>
-              <a:rPr lang="fr-FR" dirty="0" smtClean="0"/>
-              <a:t> en français :</a:t>
-            </a:r>
-            <a:endParaRPr lang="fr-FR" dirty="0"/>
           </a:p>
           <a:p>
             <a:endParaRPr lang="fr-FR" dirty="0"/>
           </a:p>
         </p:txBody>
       </p:sp>
-      <p:pic>
-        <p:nvPicPr>
-          <p:cNvPr id="5" name="Image 4"/>
-          <p:cNvPicPr>
-            <a:picLocks noChangeAspect="1"/>
-          </p:cNvPicPr>
-          <p:nvPr/>
-        </p:nvPicPr>
-        <p:blipFill>
-          <a:blip r:embed="rId2"/>
-          <a:stretch>
-            <a:fillRect/>
-          </a:stretch>
-        </p:blipFill>
-        <p:spPr>
-          <a:xfrm>
-            <a:off x="1087674" y="3617248"/>
-            <a:ext cx="7193884" cy="2579386"/>
-          </a:xfrm>
-          <a:prstGeom prst="rect">
-            <a:avLst/>
-          </a:prstGeom>
-          <a:ln>
-            <a:solidFill>
-              <a:schemeClr val="tx1"/>
-            </a:solidFill>
-          </a:ln>
-        </p:spPr>
-      </p:pic>
     </p:spTree>
     <p:extLst>
       <p:ext uri="{BB962C8B-B14F-4D97-AF65-F5344CB8AC3E}">
-        <p14:creationId xmlns:p14="http://schemas.microsoft.com/office/powerpoint/2010/main" val="2812854288"/>
+        <p14:creationId xmlns:p14="http://schemas.microsoft.com/office/powerpoint/2010/main" val="624187777"/>
       </p:ext>
     </p:extLst>
   </p:cSld>
   <p:clrMapOvr>
     <a:masterClrMapping/>
   </p:clrMapOvr>
+  <p:timing>
+    <p:tnLst>
+      <p:par>
+        <p:cTn id="1" dur="indefinite" restart="never" nodeType="tmRoot"/>
+      </p:par>
+    </p:tnLst>
+  </p:timing>
 </p:sld>
 </file>
 
@@ -11228,9 +11550,78 @@
           </a:p>
         </p:txBody>
       </p:sp>
+      <p:sp>
+        <p:nvSpPr>
+          <p:cNvPr id="4" name="ZoneTexte 3"/>
+          <p:cNvSpPr txBox="1"/>
+          <p:nvPr/>
+        </p:nvSpPr>
+        <p:spPr>
+          <a:xfrm>
+            <a:off x="704916" y="1425326"/>
+            <a:ext cx="7959400" cy="1754326"/>
+          </a:xfrm>
+          <a:prstGeom prst="rect">
+            <a:avLst/>
+          </a:prstGeom>
+          <a:noFill/>
+        </p:spPr>
+        <p:txBody>
+          <a:bodyPr wrap="square" rtlCol="0">
+            <a:spAutoFit/>
+          </a:bodyPr>
+          <a:lstStyle/>
+          <a:p>
+            <a:r>
+              <a:rPr lang="fr-FR" dirty="0" smtClean="0"/>
+              <a:t>SAS </a:t>
+            </a:r>
+            <a:r>
+              <a:rPr lang="fr-FR" dirty="0" err="1" smtClean="0"/>
+              <a:t>Planet</a:t>
+            </a:r>
+            <a:r>
+              <a:rPr lang="fr-FR" dirty="0" smtClean="0"/>
+              <a:t> est un logiciel extrêmement pratique : il permet d’afficher de nombreuses sources de </a:t>
+            </a:r>
+            <a:r>
+              <a:rPr lang="fr-FR" dirty="0" err="1" smtClean="0"/>
+              <a:t>carto</a:t>
+            </a:r>
+            <a:r>
+              <a:rPr lang="fr-FR" dirty="0" smtClean="0"/>
+              <a:t> et de les exporter facilement</a:t>
+            </a:r>
+          </a:p>
+          <a:p>
+            <a:endParaRPr lang="fr-FR" dirty="0" smtClean="0"/>
+          </a:p>
+          <a:p>
+            <a:endParaRPr lang="fr-FR" dirty="0"/>
+          </a:p>
+          <a:p>
+            <a:r>
+              <a:rPr lang="fr-FR" dirty="0" smtClean="0"/>
+              <a:t>Passer SAS </a:t>
+            </a:r>
+            <a:r>
+              <a:rPr lang="fr-FR" dirty="0" err="1" smtClean="0"/>
+              <a:t>Planet</a:t>
+            </a:r>
+            <a:r>
+              <a:rPr lang="fr-FR" dirty="0" smtClean="0"/>
+              <a:t> en français :</a:t>
+            </a:r>
+            <a:endParaRPr lang="fr-FR" dirty="0"/>
+          </a:p>
+          <a:p>
+            <a:endParaRPr lang="fr-FR" dirty="0"/>
+          </a:p>
+        </p:txBody>
+      </p:sp>
       <p:pic>
         <p:nvPicPr>
-          <p:cNvPr id="2" name="Image 1"/>
+          <p:cNvPr id="5" name="Image 4"/>
           <p:cNvPicPr>
             <a:picLocks noChangeAspect="1"/>
           </p:cNvPicPr>
@@ -11244,8 +11635,8 @@
         </p:blipFill>
         <p:spPr>
           <a:xfrm>
-            <a:off x="247716" y="2071657"/>
-            <a:ext cx="4543425" cy="4124325"/>
+            <a:off x="1087674" y="3617248"/>
+            <a:ext cx="7193884" cy="2579386"/>
           </a:xfrm>
           <a:prstGeom prst="rect">
             <a:avLst/>
@@ -11257,99 +11648,10 @@
           </a:ln>
         </p:spPr>
       </p:pic>
-      <p:pic>
-        <p:nvPicPr>
-          <p:cNvPr id="6" name="Image 5"/>
-          <p:cNvPicPr>
-            <a:picLocks noChangeAspect="1"/>
-          </p:cNvPicPr>
-          <p:nvPr/>
-        </p:nvPicPr>
-        <p:blipFill>
-          <a:blip r:embed="rId3"/>
-          <a:stretch>
-            <a:fillRect/>
-          </a:stretch>
-        </p:blipFill>
-        <p:spPr>
-          <a:xfrm>
-            <a:off x="6187816" y="3681382"/>
-            <a:ext cx="2476500" cy="2514600"/>
-          </a:xfrm>
-          <a:prstGeom prst="rect">
-            <a:avLst/>
-          </a:prstGeom>
-          <a:ln>
-            <a:solidFill>
-              <a:schemeClr val="tx1"/>
-            </a:solidFill>
-          </a:ln>
-        </p:spPr>
-      </p:pic>
-      <p:sp>
-        <p:nvSpPr>
-          <p:cNvPr id="5" name="ZoneTexte 4"/>
-          <p:cNvSpPr txBox="1"/>
-          <p:nvPr/>
-        </p:nvSpPr>
-        <p:spPr>
-          <a:xfrm>
-            <a:off x="247716" y="1489865"/>
-            <a:ext cx="4701971" cy="369332"/>
-          </a:xfrm>
-          <a:prstGeom prst="rect">
-            <a:avLst/>
-          </a:prstGeom>
-          <a:noFill/>
-        </p:spPr>
-        <p:txBody>
-          <a:bodyPr wrap="square" rtlCol="0">
-            <a:spAutoFit/>
-          </a:bodyPr>
-          <a:lstStyle/>
-          <a:p>
-            <a:r>
-              <a:rPr lang="fr-FR" dirty="0" smtClean="0"/>
-              <a:t>Choix de la/des couches à afficher/exporter</a:t>
-            </a:r>
-            <a:endParaRPr lang="fr-FR" dirty="0"/>
-          </a:p>
-        </p:txBody>
-      </p:sp>
-      <p:sp>
-        <p:nvSpPr>
-          <p:cNvPr id="7" name="ZoneTexte 6"/>
-          <p:cNvSpPr txBox="1"/>
-          <p:nvPr/>
-        </p:nvSpPr>
-        <p:spPr>
-          <a:xfrm>
-            <a:off x="6187816" y="2869812"/>
-            <a:ext cx="2106614" cy="646331"/>
-          </a:xfrm>
-          <a:prstGeom prst="rect">
-            <a:avLst/>
-          </a:prstGeom>
-          <a:noFill/>
-        </p:spPr>
-        <p:txBody>
-          <a:bodyPr wrap="square" rtlCol="0">
-            <a:spAutoFit/>
-          </a:bodyPr>
-          <a:lstStyle/>
-          <a:p>
-            <a:r>
-              <a:rPr lang="fr-FR" dirty="0" smtClean="0"/>
-              <a:t>Sélection de la zone à exporter</a:t>
-            </a:r>
-            <a:endParaRPr lang="fr-FR" dirty="0"/>
-          </a:p>
-        </p:txBody>
-      </p:sp>
     </p:spTree>
     <p:extLst>
       <p:ext uri="{BB962C8B-B14F-4D97-AF65-F5344CB8AC3E}">
-        <p14:creationId xmlns:p14="http://schemas.microsoft.com/office/powerpoint/2010/main" val="2523146313"/>
+        <p14:creationId xmlns:p14="http://schemas.microsoft.com/office/powerpoint/2010/main" val="2812854288"/>
       </p:ext>
     </p:extLst>
   </p:cSld>
@@ -11411,79 +11713,6 @@
           </a:p>
         </p:txBody>
       </p:sp>
-      <p:sp>
-        <p:nvSpPr>
-          <p:cNvPr id="5" name="ZoneTexte 4"/>
-          <p:cNvSpPr txBox="1"/>
-          <p:nvPr/>
-        </p:nvSpPr>
-        <p:spPr>
-          <a:xfrm>
-            <a:off x="36592" y="5498457"/>
-            <a:ext cx="9070816" cy="1200329"/>
-          </a:xfrm>
-          <a:prstGeom prst="rect">
-            <a:avLst/>
-          </a:prstGeom>
-          <a:noFill/>
-        </p:spPr>
-        <p:txBody>
-          <a:bodyPr wrap="none" rtlCol="0">
-            <a:spAutoFit/>
-          </a:bodyPr>
-          <a:lstStyle/>
-          <a:p>
-            <a:r>
-              <a:rPr lang="fr-FR" dirty="0" smtClean="0"/>
-              <a:t>D’abord télécharger la couche voulu (photos </a:t>
-            </a:r>
-            <a:r>
-              <a:rPr lang="fr-FR" dirty="0" err="1" smtClean="0"/>
-              <a:t>sat</a:t>
-            </a:r>
-            <a:r>
-              <a:rPr lang="fr-FR" dirty="0" smtClean="0"/>
-              <a:t>, cartes scan, </a:t>
-            </a:r>
-            <a:r>
-              <a:rPr lang="fr-FR" dirty="0" err="1" smtClean="0"/>
-              <a:t>etc</a:t>
-            </a:r>
-            <a:r>
-              <a:rPr lang="fr-FR" dirty="0" smtClean="0"/>
-              <a:t>) aux niveaux de zoom voulus. </a:t>
-            </a:r>
-          </a:p>
-          <a:p>
-            <a:r>
-              <a:rPr lang="fr-FR" dirty="0" smtClean="0"/>
-              <a:t>Une fois téléchargé, la </a:t>
-            </a:r>
-            <a:r>
-              <a:rPr lang="fr-FR" dirty="0" err="1" smtClean="0"/>
-              <a:t>carto</a:t>
-            </a:r>
-            <a:r>
-              <a:rPr lang="fr-FR" dirty="0" smtClean="0"/>
-              <a:t> est en cache et est plus rapide à traiter</a:t>
-            </a:r>
-          </a:p>
-          <a:p>
-            <a:endParaRPr lang="fr-FR" dirty="0"/>
-          </a:p>
-          <a:p>
-            <a:r>
-              <a:rPr lang="fr-FR" dirty="0"/>
-              <a:t>Le zoom courant est affiché sur la gauche de la </a:t>
-            </a:r>
-            <a:r>
-              <a:rPr lang="fr-FR" dirty="0" smtClean="0"/>
-              <a:t>fenêtre</a:t>
-            </a:r>
-            <a:endParaRPr lang="fr-FR" dirty="0"/>
-          </a:p>
-        </p:txBody>
-      </p:sp>
       <p:pic>
         <p:nvPicPr>
           <p:cNvPr id="2" name="Image 1"/>
@@ -11500,8 +11729,8 @@
         </p:blipFill>
         <p:spPr>
           <a:xfrm>
-            <a:off x="2228850" y="1628775"/>
-            <a:ext cx="4686300" cy="3600450"/>
+            <a:off x="247716" y="2071657"/>
+            <a:ext cx="4543425" cy="4124325"/>
           </a:xfrm>
           <a:prstGeom prst="rect">
             <a:avLst/>
@@ -11513,10 +11742,99 @@
           </a:ln>
         </p:spPr>
       </p:pic>
+      <p:pic>
+        <p:nvPicPr>
+          <p:cNvPr id="6" name="Image 5"/>
+          <p:cNvPicPr>
+            <a:picLocks noChangeAspect="1"/>
+          </p:cNvPicPr>
+          <p:nvPr/>
+        </p:nvPicPr>
+        <p:blipFill>
+          <a:blip r:embed="rId3"/>
+          <a:stretch>
+            <a:fillRect/>
+          </a:stretch>
+        </p:blipFill>
+        <p:spPr>
+          <a:xfrm>
+            <a:off x="6187816" y="3681382"/>
+            <a:ext cx="2476500" cy="2514600"/>
+          </a:xfrm>
+          <a:prstGeom prst="rect">
+            <a:avLst/>
+          </a:prstGeom>
+          <a:ln>
+            <a:solidFill>
+              <a:schemeClr val="tx1"/>
+            </a:solidFill>
+          </a:ln>
+        </p:spPr>
+      </p:pic>
+      <p:sp>
+        <p:nvSpPr>
+          <p:cNvPr id="5" name="ZoneTexte 4"/>
+          <p:cNvSpPr txBox="1"/>
+          <p:nvPr/>
+        </p:nvSpPr>
+        <p:spPr>
+          <a:xfrm>
+            <a:off x="247716" y="1489865"/>
+            <a:ext cx="4701971" cy="369332"/>
+          </a:xfrm>
+          <a:prstGeom prst="rect">
+            <a:avLst/>
+          </a:prstGeom>
+          <a:noFill/>
+        </p:spPr>
+        <p:txBody>
+          <a:bodyPr wrap="square" rtlCol="0">
+            <a:spAutoFit/>
+          </a:bodyPr>
+          <a:lstStyle/>
+          <a:p>
+            <a:r>
+              <a:rPr lang="fr-FR" dirty="0" smtClean="0"/>
+              <a:t>Choix de la/des couches à afficher/exporter</a:t>
+            </a:r>
+            <a:endParaRPr lang="fr-FR" dirty="0"/>
+          </a:p>
+        </p:txBody>
+      </p:sp>
+      <p:sp>
+        <p:nvSpPr>
+          <p:cNvPr id="7" name="ZoneTexte 6"/>
+          <p:cNvSpPr txBox="1"/>
+          <p:nvPr/>
+        </p:nvSpPr>
+        <p:spPr>
+          <a:xfrm>
+            <a:off x="6187816" y="2869812"/>
+            <a:ext cx="2106614" cy="646331"/>
+          </a:xfrm>
+          <a:prstGeom prst="rect">
+            <a:avLst/>
+          </a:prstGeom>
+          <a:noFill/>
+        </p:spPr>
+        <p:txBody>
+          <a:bodyPr wrap="square" rtlCol="0">
+            <a:spAutoFit/>
+          </a:bodyPr>
+          <a:lstStyle/>
+          <a:p>
+            <a:r>
+              <a:rPr lang="fr-FR" dirty="0" smtClean="0"/>
+              <a:t>Sélection de la zone à exporter</a:t>
+            </a:r>
+            <a:endParaRPr lang="fr-FR" dirty="0"/>
+          </a:p>
+        </p:txBody>
+      </p:sp>
     </p:spTree>
     <p:extLst>
       <p:ext uri="{BB962C8B-B14F-4D97-AF65-F5344CB8AC3E}">
-        <p14:creationId xmlns:p14="http://schemas.microsoft.com/office/powerpoint/2010/main" val="2692379561"/>
+        <p14:creationId xmlns:p14="http://schemas.microsoft.com/office/powerpoint/2010/main" val="2523146313"/>
       </p:ext>
     </p:extLst>
   </p:cSld>
@@ -11586,8 +11904,8 @@
         </p:nvSpPr>
         <p:spPr>
           <a:xfrm>
-            <a:off x="1056485" y="5637605"/>
-            <a:ext cx="7031027" cy="923330"/>
+            <a:off x="36592" y="5498457"/>
+            <a:ext cx="9070816" cy="1200329"/>
           </a:xfrm>
           <a:prstGeom prst="rect">
             <a:avLst/>
@@ -11602,7 +11920,29 @@
           <a:p>
             <a:r>
               <a:rPr lang="fr-FR" dirty="0" smtClean="0"/>
-              <a:t>L’onglet Assembler permet d’exporter la </a:t>
+              <a:t>D’abord télécharger la couche voulu (photos </a:t>
+            </a:r>
+            <a:r>
+              <a:rPr lang="fr-FR" dirty="0" err="1" smtClean="0"/>
+              <a:t>sat</a:t>
+            </a:r>
+            <a:r>
+              <a:rPr lang="fr-FR" dirty="0" smtClean="0"/>
+              <a:t>, cartes scan, </a:t>
+            </a:r>
+            <a:r>
+              <a:rPr lang="fr-FR" dirty="0" err="1" smtClean="0"/>
+              <a:t>etc</a:t>
+            </a:r>
+            <a:r>
+              <a:rPr lang="fr-FR" dirty="0" smtClean="0"/>
+              <a:t>) aux niveaux de zoom voulus. </a:t>
+            </a:r>
+          </a:p>
+          <a:p>
+            <a:r>
+              <a:rPr lang="fr-FR" dirty="0" smtClean="0"/>
+              <a:t>Une fois téléchargé, la </a:t>
             </a:r>
             <a:r>
               <a:rPr lang="fr-FR" dirty="0" err="1" smtClean="0"/>
@@ -11610,27 +11950,20 @@
             </a:r>
             <a:r>
               <a:rPr lang="fr-FR" dirty="0" smtClean="0"/>
-              <a:t> dans un format exploitable</a:t>
-            </a:r>
-          </a:p>
-          <a:p>
-            <a:pPr marL="285750" indent="-285750">
-              <a:buFontTx/>
-              <a:buChar char="-"/>
-            </a:pPr>
+              <a:t> est en cache et est plus rapide à traiter</a:t>
+            </a:r>
+          </a:p>
+          <a:p>
+            <a:endParaRPr lang="fr-FR" dirty="0"/>
+          </a:p>
+          <a:p>
+            <a:r>
+              <a:rPr lang="fr-FR" dirty="0"/>
+              <a:t>Le zoom courant est affiché sur la gauche de la </a:t>
+            </a:r>
             <a:r>
               <a:rPr lang="fr-FR" dirty="0" smtClean="0"/>
-              <a:t>Choisir la carte, le niveau de zoom</a:t>
-            </a:r>
-          </a:p>
-          <a:p>
-            <a:pPr marL="285750" indent="-285750">
-              <a:buFontTx/>
-              <a:buChar char="-"/>
-            </a:pPr>
-            <a:r>
-              <a:rPr lang="fr-FR" dirty="0" smtClean="0"/>
-              <a:t>Il est possible de découper la carte si elle est imposante</a:t>
+              <a:t>fenêtre</a:t>
             </a:r>
             <a:endParaRPr lang="fr-FR" dirty="0"/>
           </a:p>
@@ -11652,8 +11985,8 @@
         </p:blipFill>
         <p:spPr>
           <a:xfrm>
-            <a:off x="2290760" y="1502917"/>
-            <a:ext cx="4562475" cy="3619500"/>
+            <a:off x="2228850" y="1628775"/>
+            <a:ext cx="4686300" cy="3600450"/>
           </a:xfrm>
           <a:prstGeom prst="rect">
             <a:avLst/>
@@ -11668,7 +12001,7 @@
     </p:spTree>
     <p:extLst>
       <p:ext uri="{BB962C8B-B14F-4D97-AF65-F5344CB8AC3E}">
-        <p14:creationId xmlns:p14="http://schemas.microsoft.com/office/powerpoint/2010/main" val="3076171619"/>
+        <p14:creationId xmlns:p14="http://schemas.microsoft.com/office/powerpoint/2010/main" val="2692379561"/>
       </p:ext>
     </p:extLst>
   </p:cSld>

</xml_diff>

<commit_message>
MAJ guide cartes, ajouts de scripts pour sauvegarde, ajout du travaux pratiques v2 en cours
</commit_message>
<xml_diff>
--- a/cours/Guide - obtenir des cartes.pptx
+++ b/cours/Guide - obtenir des cartes.pptx
@@ -228,7 +228,7 @@
           <a:p>
             <a:fld id="{5C348F8D-022D-404F-B7E9-2A064090EDFB}" type="datetimeFigureOut">
               <a:rPr lang="fr-FR" smtClean="0"/>
-              <a:t>05/10/2022</a:t>
+              <a:t>24/10/2022</a:t>
             </a:fld>
             <a:endParaRPr lang="fr-FR"/>
           </a:p>
@@ -2785,7 +2785,7 @@
           <a:p>
             <a:fld id="{A74F3EA5-292C-4331-BAB5-A6575F471254}" type="datetimeFigureOut">
               <a:rPr lang="fr-FR" smtClean="0"/>
-              <a:t>05/10/2022</a:t>
+              <a:t>24/10/2022</a:t>
             </a:fld>
             <a:endParaRPr lang="fr-FR"/>
           </a:p>
@@ -2971,7 +2971,7 @@
           <a:p>
             <a:fld id="{A74F3EA5-292C-4331-BAB5-A6575F471254}" type="datetimeFigureOut">
               <a:rPr lang="fr-FR" smtClean="0"/>
-              <a:t>05/10/2022</a:t>
+              <a:t>24/10/2022</a:t>
             </a:fld>
             <a:endParaRPr lang="fr-FR"/>
           </a:p>
@@ -3157,7 +3157,7 @@
           <a:p>
             <a:fld id="{A74F3EA5-292C-4331-BAB5-A6575F471254}" type="datetimeFigureOut">
               <a:rPr lang="fr-FR" smtClean="0"/>
-              <a:t>05/10/2022</a:t>
+              <a:t>24/10/2022</a:t>
             </a:fld>
             <a:endParaRPr lang="fr-FR"/>
           </a:p>
@@ -3349,7 +3349,7 @@
           <a:p>
             <a:fld id="{A74F3EA5-292C-4331-BAB5-A6575F471254}" type="datetimeFigureOut">
               <a:rPr lang="fr-FR" smtClean="0"/>
-              <a:t>05/10/2022</a:t>
+              <a:t>24/10/2022</a:t>
             </a:fld>
             <a:endParaRPr lang="fr-FR"/>
           </a:p>
@@ -3519,7 +3519,7 @@
           <a:p>
             <a:fld id="{A74F3EA5-292C-4331-BAB5-A6575F471254}" type="datetimeFigureOut">
               <a:rPr lang="fr-FR" smtClean="0"/>
-              <a:t>05/10/2022</a:t>
+              <a:t>24/10/2022</a:t>
             </a:fld>
             <a:endParaRPr lang="fr-FR"/>
           </a:p>
@@ -3765,7 +3765,7 @@
           <a:p>
             <a:fld id="{A74F3EA5-292C-4331-BAB5-A6575F471254}" type="datetimeFigureOut">
               <a:rPr lang="fr-FR" smtClean="0"/>
-              <a:t>05/10/2022</a:t>
+              <a:t>24/10/2022</a:t>
             </a:fld>
             <a:endParaRPr lang="fr-FR"/>
           </a:p>
@@ -3997,7 +3997,7 @@
           <a:p>
             <a:fld id="{A74F3EA5-292C-4331-BAB5-A6575F471254}" type="datetimeFigureOut">
               <a:rPr lang="fr-FR" smtClean="0"/>
-              <a:t>05/10/2022</a:t>
+              <a:t>24/10/2022</a:t>
             </a:fld>
             <a:endParaRPr lang="fr-FR"/>
           </a:p>
@@ -4364,7 +4364,7 @@
           <a:p>
             <a:fld id="{A74F3EA5-292C-4331-BAB5-A6575F471254}" type="datetimeFigureOut">
               <a:rPr lang="fr-FR" smtClean="0"/>
-              <a:t>05/10/2022</a:t>
+              <a:t>24/10/2022</a:t>
             </a:fld>
             <a:endParaRPr lang="fr-FR"/>
           </a:p>
@@ -4482,7 +4482,7 @@
           <a:p>
             <a:fld id="{A74F3EA5-292C-4331-BAB5-A6575F471254}" type="datetimeFigureOut">
               <a:rPr lang="fr-FR" smtClean="0"/>
-              <a:t>05/10/2022</a:t>
+              <a:t>24/10/2022</a:t>
             </a:fld>
             <a:endParaRPr lang="fr-FR"/>
           </a:p>
@@ -4577,7 +4577,7 @@
           <a:p>
             <a:fld id="{A74F3EA5-292C-4331-BAB5-A6575F471254}" type="datetimeFigureOut">
               <a:rPr lang="fr-FR" smtClean="0"/>
-              <a:t>05/10/2022</a:t>
+              <a:t>24/10/2022</a:t>
             </a:fld>
             <a:endParaRPr lang="fr-FR"/>
           </a:p>
@@ -4854,7 +4854,7 @@
           <a:p>
             <a:fld id="{A74F3EA5-292C-4331-BAB5-A6575F471254}" type="datetimeFigureOut">
               <a:rPr lang="fr-FR" smtClean="0"/>
-              <a:t>05/10/2022</a:t>
+              <a:t>24/10/2022</a:t>
             </a:fld>
             <a:endParaRPr lang="fr-FR"/>
           </a:p>
@@ -5040,7 +5040,7 @@
           <a:p>
             <a:fld id="{A74F3EA5-292C-4331-BAB5-A6575F471254}" type="datetimeFigureOut">
               <a:rPr lang="fr-FR" smtClean="0"/>
-              <a:t>05/10/2022</a:t>
+              <a:t>24/10/2022</a:t>
             </a:fld>
             <a:endParaRPr lang="fr-FR"/>
           </a:p>
@@ -5297,7 +5297,7 @@
           <a:p>
             <a:fld id="{A74F3EA5-292C-4331-BAB5-A6575F471254}" type="datetimeFigureOut">
               <a:rPr lang="fr-FR" smtClean="0"/>
-              <a:t>05/10/2022</a:t>
+              <a:t>24/10/2022</a:t>
             </a:fld>
             <a:endParaRPr lang="fr-FR"/>
           </a:p>
@@ -5467,7 +5467,7 @@
           <a:p>
             <a:fld id="{A74F3EA5-292C-4331-BAB5-A6575F471254}" type="datetimeFigureOut">
               <a:rPr lang="fr-FR" smtClean="0"/>
-              <a:t>05/10/2022</a:t>
+              <a:t>24/10/2022</a:t>
             </a:fld>
             <a:endParaRPr lang="fr-FR"/>
           </a:p>
@@ -5647,7 +5647,7 @@
           <a:p>
             <a:fld id="{A74F3EA5-292C-4331-BAB5-A6575F471254}" type="datetimeFigureOut">
               <a:rPr lang="fr-FR" smtClean="0"/>
-              <a:t>05/10/2022</a:t>
+              <a:t>24/10/2022</a:t>
             </a:fld>
             <a:endParaRPr lang="fr-FR"/>
           </a:p>
@@ -5899,7 +5899,7 @@
           <a:p>
             <a:fld id="{A74F3EA5-292C-4331-BAB5-A6575F471254}" type="datetimeFigureOut">
               <a:rPr lang="fr-FR" smtClean="0"/>
-              <a:t>05/10/2022</a:t>
+              <a:t>24/10/2022</a:t>
             </a:fld>
             <a:endParaRPr lang="fr-FR"/>
           </a:p>
@@ -6145,7 +6145,7 @@
           <a:p>
             <a:fld id="{A74F3EA5-292C-4331-BAB5-A6575F471254}" type="datetimeFigureOut">
               <a:rPr lang="fr-FR" smtClean="0"/>
-              <a:t>05/10/2022</a:t>
+              <a:t>24/10/2022</a:t>
             </a:fld>
             <a:endParaRPr lang="fr-FR"/>
           </a:p>
@@ -6527,7 +6527,7 @@
           <a:p>
             <a:fld id="{A74F3EA5-292C-4331-BAB5-A6575F471254}" type="datetimeFigureOut">
               <a:rPr lang="fr-FR" smtClean="0"/>
-              <a:t>05/10/2022</a:t>
+              <a:t>24/10/2022</a:t>
             </a:fld>
             <a:endParaRPr lang="fr-FR"/>
           </a:p>
@@ -6653,7 +6653,7 @@
           <a:p>
             <a:fld id="{A74F3EA5-292C-4331-BAB5-A6575F471254}" type="datetimeFigureOut">
               <a:rPr lang="fr-FR" smtClean="0"/>
-              <a:t>05/10/2022</a:t>
+              <a:t>24/10/2022</a:t>
             </a:fld>
             <a:endParaRPr lang="fr-FR"/>
           </a:p>
@@ -6748,7 +6748,7 @@
           <a:p>
             <a:fld id="{A74F3EA5-292C-4331-BAB5-A6575F471254}" type="datetimeFigureOut">
               <a:rPr lang="fr-FR" smtClean="0"/>
-              <a:t>05/10/2022</a:t>
+              <a:t>24/10/2022</a:t>
             </a:fld>
             <a:endParaRPr lang="fr-FR"/>
           </a:p>
@@ -7034,7 +7034,7 @@
           <a:p>
             <a:fld id="{A74F3EA5-292C-4331-BAB5-A6575F471254}" type="datetimeFigureOut">
               <a:rPr lang="fr-FR" smtClean="0"/>
-              <a:t>05/10/2022</a:t>
+              <a:t>24/10/2022</a:t>
             </a:fld>
             <a:endParaRPr lang="fr-FR"/>
           </a:p>
@@ -7296,7 +7296,7 @@
           <a:p>
             <a:fld id="{A74F3EA5-292C-4331-BAB5-A6575F471254}" type="datetimeFigureOut">
               <a:rPr lang="fr-FR" smtClean="0"/>
-              <a:t>05/10/2022</a:t>
+              <a:t>24/10/2022</a:t>
             </a:fld>
             <a:endParaRPr lang="fr-FR"/>
           </a:p>
@@ -7414,7 +7414,7 @@
           <a:p>
             <a:fld id="{A74F3EA5-292C-4331-BAB5-A6575F471254}" type="datetimeFigureOut">
               <a:rPr lang="fr-FR" smtClean="0"/>
-              <a:t>05/10/2022</a:t>
+              <a:t>24/10/2022</a:t>
             </a:fld>
             <a:endParaRPr lang="fr-FR"/>
           </a:p>
@@ -8254,7 +8254,7 @@
           <a:p>
             <a:fld id="{A74F3EA5-292C-4331-BAB5-A6575F471254}" type="datetimeFigureOut">
               <a:rPr lang="fr-FR" smtClean="0"/>
-              <a:t>05/10/2022</a:t>
+              <a:t>24/10/2022</a:t>
             </a:fld>
             <a:endParaRPr lang="fr-FR"/>
           </a:p>
@@ -9576,7 +9576,7 @@
           <a:graphicData uri="http://schemas.openxmlformats.org/presentationml/2006/ole">
             <mc:AlternateContent xmlns:mc="http://schemas.openxmlformats.org/markup-compatibility/2006">
               <mc:Choice xmlns:v="urn:schemas-microsoft-com:vml" Requires="v">
-                <p:oleObj spid="_x0000_s2061" name="Image bitmap" r:id="rId7" imgW="2209680" imgH="2324160" progId="Paint.Picture">
+                <p:oleObj spid="_x0000_s2067" name="Image bitmap" r:id="rId7" imgW="2209680" imgH="2324160" progId="Paint.Picture">
                   <p:embed/>
                 </p:oleObj>
               </mc:Choice>
@@ -9728,29 +9728,13 @@
             </a:r>
             <a:r>
               <a:rPr lang="fr-FR" sz="1800" dirty="0" smtClean="0"/>
-              <a:t> </a:t>
-            </a:r>
+              <a:t> (OSM) met aussi à disposition des fichiers OSM</a:t>
+            </a:r>
+          </a:p>
+          <a:p>
             <a:r>
               <a:rPr lang="fr-FR" sz="1800" dirty="0" smtClean="0"/>
-              <a:t>(OSM) met aussi à disposition des fichiers OSM</a:t>
-            </a:r>
-          </a:p>
-          <a:p>
-            <a:r>
-              <a:rPr lang="fr-FR" sz="1800" dirty="0" smtClean="0"/>
-              <a:t>Il s’agit de </a:t>
-            </a:r>
-            <a:r>
-              <a:rPr lang="fr-FR" sz="1800" dirty="0" smtClean="0"/>
-              <a:t>vecteurs </a:t>
-            </a:r>
-            <a:r>
-              <a:rPr lang="fr-FR" sz="1800" dirty="0" smtClean="0"/>
-              <a:t>très complets (et volumineux</a:t>
-            </a:r>
-            <a:r>
-              <a:rPr lang="fr-FR" sz="1800" dirty="0" smtClean="0"/>
-              <a:t>)</a:t>
+              <a:t>Il s’agit de vecteurs très complets (et volumineux)</a:t>
             </a:r>
           </a:p>
           <a:p>
@@ -10470,44 +10454,121 @@
           <a:lstStyle/>
           <a:p>
             <a:r>
-              <a:rPr lang="fr-FR" sz="2000" dirty="0"/>
-              <a:t>Application APPEARS (données NASA) </a:t>
-            </a:r>
-            <a:r>
-              <a:rPr lang="fr-FR" sz="2000" dirty="0">
+              <a:rPr lang="fr-FR" sz="2400" dirty="0"/>
+              <a:t>Application </a:t>
+            </a:r>
+            <a:r>
+              <a:rPr lang="fr-FR" sz="2400" dirty="0" smtClean="0"/>
+              <a:t>APPEARS</a:t>
+            </a:r>
+          </a:p>
+          <a:p>
+            <a:pPr lvl="1"/>
+            <a:r>
+              <a:rPr lang="fr-FR" sz="1800" dirty="0" smtClean="0">
                 <a:hlinkClick r:id="rId2"/>
               </a:rPr>
-              <a:t>https://appeears.earthdatacloud.nasa.gov/</a:t>
-            </a:r>
-            <a:endParaRPr lang="fr-FR" sz="2000" dirty="0"/>
-          </a:p>
-          <a:p>
-            <a:r>
-              <a:rPr lang="fr-FR" sz="2000" dirty="0" smtClean="0"/>
-              <a:t>Alternative : </a:t>
-            </a:r>
-            <a:r>
-              <a:rPr lang="fr-FR" sz="2000" dirty="0" err="1" smtClean="0"/>
+              <a:t>https</a:t>
+            </a:r>
+            <a:r>
+              <a:rPr lang="fr-FR" sz="1800" dirty="0">
+                <a:hlinkClick r:id="rId2"/>
+              </a:rPr>
+              <a:t>://appeears.earthdatacloud.nasa.gov</a:t>
+            </a:r>
+            <a:r>
+              <a:rPr lang="fr-FR" sz="1800" dirty="0" smtClean="0">
+                <a:hlinkClick r:id="rId2"/>
+              </a:rPr>
+              <a:t>/</a:t>
+            </a:r>
+            <a:endParaRPr lang="fr-FR" sz="1800" dirty="0" smtClean="0"/>
+          </a:p>
+          <a:p>
+            <a:pPr lvl="1"/>
+            <a:r>
+              <a:rPr lang="fr-FR" sz="1800" dirty="0" smtClean="0"/>
+              <a:t>Sélection de zone à exporter</a:t>
+            </a:r>
+          </a:p>
+          <a:p>
+            <a:pPr lvl="1"/>
+            <a:r>
+              <a:rPr lang="fr-FR" sz="1800" dirty="0" smtClean="0"/>
+              <a:t>Couvre la planète</a:t>
+            </a:r>
+            <a:endParaRPr lang="fr-FR" sz="1800" dirty="0"/>
+          </a:p>
+          <a:p>
+            <a:endParaRPr lang="fr-FR" sz="2400" dirty="0" smtClean="0"/>
+          </a:p>
+          <a:p>
+            <a:r>
+              <a:rPr lang="fr-FR" sz="2400" dirty="0" err="1" smtClean="0"/>
               <a:t>OpenDEM</a:t>
             </a:r>
-            <a:r>
-              <a:rPr lang="fr-FR" sz="2000" dirty="0" smtClean="0"/>
-              <a:t> </a:t>
-            </a:r>
-            <a:r>
-              <a:rPr lang="fr-FR" sz="2000" dirty="0"/>
-              <a:t>: </a:t>
-            </a:r>
-            <a:r>
-              <a:rPr lang="fr-FR" sz="2000" dirty="0">
+            <a:endParaRPr lang="fr-FR" sz="2400" dirty="0"/>
+          </a:p>
+          <a:p>
+            <a:pPr lvl="1"/>
+            <a:r>
+              <a:rPr lang="fr-FR" sz="1800" dirty="0" smtClean="0">
                 <a:hlinkClick r:id="rId3"/>
               </a:rPr>
-              <a:t>https://www.opendem.info/link_dem.html</a:t>
-            </a:r>
-            <a:endParaRPr lang="fr-FR" sz="2000" dirty="0"/>
-          </a:p>
-          <a:p>
-            <a:endParaRPr lang="fr-FR" sz="2000" dirty="0"/>
+              <a:t>https</a:t>
+            </a:r>
+            <a:r>
+              <a:rPr lang="fr-FR" sz="1800" dirty="0">
+                <a:hlinkClick r:id="rId3"/>
+              </a:rPr>
+              <a:t>://</a:t>
+            </a:r>
+            <a:r>
+              <a:rPr lang="fr-FR" sz="1800" dirty="0" smtClean="0">
+                <a:hlinkClick r:id="rId3"/>
+              </a:rPr>
+              <a:t>www.opendem.info/link_dem.html</a:t>
+            </a:r>
+            <a:endParaRPr lang="fr-FR" sz="1800" dirty="0" smtClean="0"/>
+          </a:p>
+          <a:p>
+            <a:pPr lvl="1"/>
+            <a:r>
+              <a:rPr lang="fr-FR" sz="1800" dirty="0" smtClean="0"/>
+              <a:t>Tuiles </a:t>
+            </a:r>
+            <a:r>
+              <a:rPr lang="fr-FR" sz="1800" dirty="0" err="1" smtClean="0"/>
+              <a:t>pré-fabriquées</a:t>
+            </a:r>
+            <a:endParaRPr lang="fr-FR" sz="1800" dirty="0" smtClean="0"/>
+          </a:p>
+          <a:p>
+            <a:pPr lvl="1"/>
+            <a:r>
+              <a:rPr lang="fr-FR" sz="1800" dirty="0" smtClean="0"/>
+              <a:t>Couvre des zones étendues </a:t>
+            </a:r>
+            <a:r>
+              <a:rPr lang="fr-FR" sz="1800" smtClean="0"/>
+              <a:t>(Europe</a:t>
+            </a:r>
+            <a:r>
+              <a:rPr lang="fr-FR" sz="1800" dirty="0" smtClean="0"/>
+              <a:t>, </a:t>
+            </a:r>
+            <a:r>
+              <a:rPr lang="fr-FR" sz="1800" dirty="0" err="1" smtClean="0"/>
+              <a:t>etc</a:t>
+            </a:r>
+            <a:r>
+              <a:rPr lang="fr-FR" sz="1800" dirty="0" smtClean="0"/>
+              <a:t>)</a:t>
+            </a:r>
+            <a:endParaRPr lang="fr-FR" sz="1800" dirty="0"/>
+          </a:p>
+          <a:p>
+            <a:endParaRPr lang="fr-FR" sz="2400" dirty="0"/>
           </a:p>
         </p:txBody>
       </p:sp>
@@ -10527,8 +10588,8 @@
         </p:blipFill>
         <p:spPr>
           <a:xfrm>
-            <a:off x="4629150" y="2889868"/>
-            <a:ext cx="6991350" cy="3791919"/>
+            <a:off x="6032567" y="3517290"/>
+            <a:ext cx="6159433" cy="3340710"/>
           </a:xfrm>
           <a:prstGeom prst="rect">
             <a:avLst/>
@@ -15242,11 +15303,7 @@
             </a:r>
             <a:r>
               <a:rPr lang="fr-FR" sz="2000" dirty="0" smtClean="0"/>
-              <a:t>sélectionné vers </a:t>
-            </a:r>
-            <a:r>
-              <a:rPr lang="fr-FR" sz="2000" dirty="0" smtClean="0"/>
-              <a:t>le </a:t>
+              <a:t>sélectionné vers le </a:t>
             </a:r>
             <a:r>
               <a:rPr lang="fr-FR" sz="2000" smtClean="0"/>

</xml_diff>